<commit_message>
Now translating attractions to English where possible.
</commit_message>
<xml_diff>
--- a/Frontend frameworks.pptx
+++ b/Frontend frameworks.pptx
@@ -10,6 +10,8 @@
     <p:sldId id="258" r:id="rId4"/>
     <p:sldId id="259" r:id="rId5"/>
     <p:sldId id="260" r:id="rId6"/>
+    <p:sldId id="261" r:id="rId7"/>
+    <p:sldId id="262" r:id="rId8"/>
   </p:sldIdLst>
   <p:sldSz cx="12192000" cy="6858000"/>
   <p:notesSz cx="7315200" cy="9601200"/>
@@ -108,7 +110,2627 @@
       </a:defRPr>
     </a:lvl9pPr>
   </p:defaultTextStyle>
+  <p:extLst>
+    <p:ext uri="{EFAFB233-063F-42B5-8137-9DF3F51BA10A}">
+      <p15:sldGuideLst xmlns:p15="http://schemas.microsoft.com/office/powerpoint/2012/main"/>
+    </p:ext>
+  </p:extLst>
 </p:presentation>
+</file>
+
+<file path=ppt/diagrams/colors1.xml><?xml version="1.0" encoding="utf-8"?>
+<dgm:colorsDef xmlns:dgm="http://schemas.openxmlformats.org/drawingml/2006/diagram" xmlns:a="http://schemas.openxmlformats.org/drawingml/2006/main" uniqueId="urn:microsoft.com/office/officeart/2005/8/colors/accent1_2">
+  <dgm:title val=""/>
+  <dgm:desc val=""/>
+  <dgm:catLst>
+    <dgm:cat type="accent1" pri="11200"/>
+  </dgm:catLst>
+  <dgm:styleLbl name="node0">
+    <dgm:fillClrLst meth="repeat">
+      <a:schemeClr val="accent1"/>
+    </dgm:fillClrLst>
+    <dgm:linClrLst meth="repeat">
+      <a:schemeClr val="lt1"/>
+    </dgm:linClrLst>
+    <dgm:effectClrLst/>
+    <dgm:txLinClrLst/>
+    <dgm:txFillClrLst/>
+    <dgm:txEffectClrLst/>
+  </dgm:styleLbl>
+  <dgm:styleLbl name="alignNode1">
+    <dgm:fillClrLst meth="repeat">
+      <a:schemeClr val="accent1"/>
+    </dgm:fillClrLst>
+    <dgm:linClrLst meth="repeat">
+      <a:schemeClr val="accent1"/>
+    </dgm:linClrLst>
+    <dgm:effectClrLst/>
+    <dgm:txLinClrLst/>
+    <dgm:txFillClrLst/>
+    <dgm:txEffectClrLst/>
+  </dgm:styleLbl>
+  <dgm:styleLbl name="node1">
+    <dgm:fillClrLst meth="repeat">
+      <a:schemeClr val="accent1"/>
+    </dgm:fillClrLst>
+    <dgm:linClrLst meth="repeat">
+      <a:schemeClr val="lt1"/>
+    </dgm:linClrLst>
+    <dgm:effectClrLst/>
+    <dgm:txLinClrLst/>
+    <dgm:txFillClrLst/>
+    <dgm:txEffectClrLst/>
+  </dgm:styleLbl>
+  <dgm:styleLbl name="lnNode1">
+    <dgm:fillClrLst meth="repeat">
+      <a:schemeClr val="accent1"/>
+    </dgm:fillClrLst>
+    <dgm:linClrLst meth="repeat">
+      <a:schemeClr val="lt1"/>
+    </dgm:linClrLst>
+    <dgm:effectClrLst/>
+    <dgm:txLinClrLst/>
+    <dgm:txFillClrLst/>
+    <dgm:txEffectClrLst/>
+  </dgm:styleLbl>
+  <dgm:styleLbl name="vennNode1">
+    <dgm:fillClrLst meth="repeat">
+      <a:schemeClr val="accent1">
+        <a:alpha val="50000"/>
+      </a:schemeClr>
+    </dgm:fillClrLst>
+    <dgm:linClrLst meth="repeat">
+      <a:schemeClr val="lt1"/>
+    </dgm:linClrLst>
+    <dgm:effectClrLst/>
+    <dgm:txLinClrLst/>
+    <dgm:txFillClrLst/>
+    <dgm:txEffectClrLst/>
+  </dgm:styleLbl>
+  <dgm:styleLbl name="node2">
+    <dgm:fillClrLst meth="repeat">
+      <a:schemeClr val="accent1"/>
+    </dgm:fillClrLst>
+    <dgm:linClrLst meth="repeat">
+      <a:schemeClr val="lt1"/>
+    </dgm:linClrLst>
+    <dgm:effectClrLst/>
+    <dgm:txLinClrLst/>
+    <dgm:txFillClrLst/>
+    <dgm:txEffectClrLst/>
+  </dgm:styleLbl>
+  <dgm:styleLbl name="node3">
+    <dgm:fillClrLst meth="repeat">
+      <a:schemeClr val="accent1"/>
+    </dgm:fillClrLst>
+    <dgm:linClrLst meth="repeat">
+      <a:schemeClr val="lt1"/>
+    </dgm:linClrLst>
+    <dgm:effectClrLst/>
+    <dgm:txLinClrLst/>
+    <dgm:txFillClrLst/>
+    <dgm:txEffectClrLst/>
+  </dgm:styleLbl>
+  <dgm:styleLbl name="node4">
+    <dgm:fillClrLst meth="repeat">
+      <a:schemeClr val="accent1"/>
+    </dgm:fillClrLst>
+    <dgm:linClrLst meth="repeat">
+      <a:schemeClr val="lt1"/>
+    </dgm:linClrLst>
+    <dgm:effectClrLst/>
+    <dgm:txLinClrLst/>
+    <dgm:txFillClrLst/>
+    <dgm:txEffectClrLst/>
+  </dgm:styleLbl>
+  <dgm:styleLbl name="fgImgPlace1">
+    <dgm:fillClrLst meth="repeat">
+      <a:schemeClr val="accent1">
+        <a:tint val="50000"/>
+      </a:schemeClr>
+    </dgm:fillClrLst>
+    <dgm:linClrLst meth="repeat">
+      <a:schemeClr val="lt1"/>
+    </dgm:linClrLst>
+    <dgm:effectClrLst/>
+    <dgm:txLinClrLst/>
+    <dgm:txFillClrLst meth="repeat">
+      <a:schemeClr val="lt1"/>
+    </dgm:txFillClrLst>
+    <dgm:txEffectClrLst/>
+  </dgm:styleLbl>
+  <dgm:styleLbl name="alignImgPlace1">
+    <dgm:fillClrLst meth="repeat">
+      <a:schemeClr val="accent1">
+        <a:tint val="50000"/>
+      </a:schemeClr>
+    </dgm:fillClrLst>
+    <dgm:linClrLst meth="repeat">
+      <a:schemeClr val="lt1"/>
+    </dgm:linClrLst>
+    <dgm:effectClrLst/>
+    <dgm:txLinClrLst/>
+    <dgm:txFillClrLst meth="repeat">
+      <a:schemeClr val="lt1"/>
+    </dgm:txFillClrLst>
+    <dgm:txEffectClrLst/>
+  </dgm:styleLbl>
+  <dgm:styleLbl name="bgImgPlace1">
+    <dgm:fillClrLst meth="repeat">
+      <a:schemeClr val="accent1">
+        <a:tint val="50000"/>
+      </a:schemeClr>
+    </dgm:fillClrLst>
+    <dgm:linClrLst meth="repeat">
+      <a:schemeClr val="lt1"/>
+    </dgm:linClrLst>
+    <dgm:effectClrLst/>
+    <dgm:txLinClrLst/>
+    <dgm:txFillClrLst meth="repeat">
+      <a:schemeClr val="lt1"/>
+    </dgm:txFillClrLst>
+    <dgm:txEffectClrLst/>
+  </dgm:styleLbl>
+  <dgm:styleLbl name="sibTrans2D1">
+    <dgm:fillClrLst meth="repeat">
+      <a:schemeClr val="accent1">
+        <a:tint val="60000"/>
+      </a:schemeClr>
+    </dgm:fillClrLst>
+    <dgm:linClrLst meth="repeat">
+      <a:schemeClr val="accent1">
+        <a:tint val="60000"/>
+      </a:schemeClr>
+    </dgm:linClrLst>
+    <dgm:effectClrLst/>
+    <dgm:txLinClrLst/>
+    <dgm:txFillClrLst/>
+    <dgm:txEffectClrLst/>
+  </dgm:styleLbl>
+  <dgm:styleLbl name="fgSibTrans2D1">
+    <dgm:fillClrLst meth="repeat">
+      <a:schemeClr val="accent1">
+        <a:tint val="60000"/>
+      </a:schemeClr>
+    </dgm:fillClrLst>
+    <dgm:linClrLst meth="repeat">
+      <a:schemeClr val="accent1">
+        <a:tint val="60000"/>
+      </a:schemeClr>
+    </dgm:linClrLst>
+    <dgm:effectClrLst/>
+    <dgm:txLinClrLst/>
+    <dgm:txFillClrLst/>
+    <dgm:txEffectClrLst/>
+  </dgm:styleLbl>
+  <dgm:styleLbl name="bgSibTrans2D1">
+    <dgm:fillClrLst meth="repeat">
+      <a:schemeClr val="accent1">
+        <a:tint val="60000"/>
+      </a:schemeClr>
+    </dgm:fillClrLst>
+    <dgm:linClrLst meth="repeat">
+      <a:schemeClr val="accent1">
+        <a:tint val="60000"/>
+      </a:schemeClr>
+    </dgm:linClrLst>
+    <dgm:effectClrLst/>
+    <dgm:txLinClrLst/>
+    <dgm:txFillClrLst/>
+    <dgm:txEffectClrLst/>
+  </dgm:styleLbl>
+  <dgm:styleLbl name="sibTrans1D1">
+    <dgm:fillClrLst meth="repeat">
+      <a:schemeClr val="accent1"/>
+    </dgm:fillClrLst>
+    <dgm:linClrLst meth="repeat">
+      <a:schemeClr val="accent1"/>
+    </dgm:linClrLst>
+    <dgm:effectClrLst/>
+    <dgm:txLinClrLst/>
+    <dgm:txFillClrLst meth="repeat">
+      <a:schemeClr val="tx1"/>
+    </dgm:txFillClrLst>
+    <dgm:txEffectClrLst/>
+  </dgm:styleLbl>
+  <dgm:styleLbl name="callout">
+    <dgm:fillClrLst meth="repeat">
+      <a:schemeClr val="accent1"/>
+    </dgm:fillClrLst>
+    <dgm:linClrLst meth="repeat">
+      <a:schemeClr val="accent1">
+        <a:tint val="50000"/>
+      </a:schemeClr>
+    </dgm:linClrLst>
+    <dgm:effectClrLst/>
+    <dgm:txLinClrLst/>
+    <dgm:txFillClrLst meth="repeat">
+      <a:schemeClr val="tx1"/>
+    </dgm:txFillClrLst>
+    <dgm:txEffectClrLst/>
+  </dgm:styleLbl>
+  <dgm:styleLbl name="asst0">
+    <dgm:fillClrLst meth="repeat">
+      <a:schemeClr val="accent1"/>
+    </dgm:fillClrLst>
+    <dgm:linClrLst meth="repeat">
+      <a:schemeClr val="lt1"/>
+    </dgm:linClrLst>
+    <dgm:effectClrLst/>
+    <dgm:txLinClrLst/>
+    <dgm:txFillClrLst/>
+    <dgm:txEffectClrLst/>
+  </dgm:styleLbl>
+  <dgm:styleLbl name="asst1">
+    <dgm:fillClrLst meth="repeat">
+      <a:schemeClr val="accent1"/>
+    </dgm:fillClrLst>
+    <dgm:linClrLst meth="repeat">
+      <a:schemeClr val="lt1"/>
+    </dgm:linClrLst>
+    <dgm:effectClrLst/>
+    <dgm:txLinClrLst/>
+    <dgm:txFillClrLst/>
+    <dgm:txEffectClrLst/>
+  </dgm:styleLbl>
+  <dgm:styleLbl name="asst2">
+    <dgm:fillClrLst meth="repeat">
+      <a:schemeClr val="accent1"/>
+    </dgm:fillClrLst>
+    <dgm:linClrLst meth="repeat">
+      <a:schemeClr val="lt1"/>
+    </dgm:linClrLst>
+    <dgm:effectClrLst/>
+    <dgm:txLinClrLst/>
+    <dgm:txFillClrLst/>
+    <dgm:txEffectClrLst/>
+  </dgm:styleLbl>
+  <dgm:styleLbl name="asst3">
+    <dgm:fillClrLst meth="repeat">
+      <a:schemeClr val="accent1"/>
+    </dgm:fillClrLst>
+    <dgm:linClrLst meth="repeat">
+      <a:schemeClr val="lt1"/>
+    </dgm:linClrLst>
+    <dgm:effectClrLst/>
+    <dgm:txLinClrLst/>
+    <dgm:txFillClrLst/>
+    <dgm:txEffectClrLst/>
+  </dgm:styleLbl>
+  <dgm:styleLbl name="asst4">
+    <dgm:fillClrLst meth="repeat">
+      <a:schemeClr val="accent1"/>
+    </dgm:fillClrLst>
+    <dgm:linClrLst meth="repeat">
+      <a:schemeClr val="lt1"/>
+    </dgm:linClrLst>
+    <dgm:effectClrLst/>
+    <dgm:txLinClrLst/>
+    <dgm:txFillClrLst/>
+    <dgm:txEffectClrLst/>
+  </dgm:styleLbl>
+  <dgm:styleLbl name="parChTrans2D1">
+    <dgm:fillClrLst meth="repeat">
+      <a:schemeClr val="accent1">
+        <a:tint val="60000"/>
+      </a:schemeClr>
+    </dgm:fillClrLst>
+    <dgm:linClrLst meth="repeat">
+      <a:schemeClr val="accent1">
+        <a:tint val="60000"/>
+      </a:schemeClr>
+    </dgm:linClrLst>
+    <dgm:effectClrLst/>
+    <dgm:txLinClrLst/>
+    <dgm:txFillClrLst meth="repeat">
+      <a:schemeClr val="lt1"/>
+    </dgm:txFillClrLst>
+    <dgm:txEffectClrLst/>
+  </dgm:styleLbl>
+  <dgm:styleLbl name="parChTrans2D2">
+    <dgm:fillClrLst meth="repeat">
+      <a:schemeClr val="accent1"/>
+    </dgm:fillClrLst>
+    <dgm:linClrLst meth="repeat">
+      <a:schemeClr val="accent1"/>
+    </dgm:linClrLst>
+    <dgm:effectClrLst/>
+    <dgm:txLinClrLst/>
+    <dgm:txFillClrLst meth="repeat">
+      <a:schemeClr val="lt1"/>
+    </dgm:txFillClrLst>
+    <dgm:txEffectClrLst/>
+  </dgm:styleLbl>
+  <dgm:styleLbl name="parChTrans2D3">
+    <dgm:fillClrLst meth="repeat">
+      <a:schemeClr val="accent1"/>
+    </dgm:fillClrLst>
+    <dgm:linClrLst meth="repeat">
+      <a:schemeClr val="accent1"/>
+    </dgm:linClrLst>
+    <dgm:effectClrLst/>
+    <dgm:txLinClrLst/>
+    <dgm:txFillClrLst meth="repeat">
+      <a:schemeClr val="lt1"/>
+    </dgm:txFillClrLst>
+    <dgm:txEffectClrLst/>
+  </dgm:styleLbl>
+  <dgm:styleLbl name="parChTrans2D4">
+    <dgm:fillClrLst meth="repeat">
+      <a:schemeClr val="accent1"/>
+    </dgm:fillClrLst>
+    <dgm:linClrLst meth="repeat">
+      <a:schemeClr val="accent1"/>
+    </dgm:linClrLst>
+    <dgm:effectClrLst/>
+    <dgm:txLinClrLst/>
+    <dgm:txFillClrLst meth="repeat">
+      <a:schemeClr val="lt1"/>
+    </dgm:txFillClrLst>
+    <dgm:txEffectClrLst/>
+  </dgm:styleLbl>
+  <dgm:styleLbl name="parChTrans1D1">
+    <dgm:fillClrLst meth="repeat">
+      <a:schemeClr val="accent1"/>
+    </dgm:fillClrLst>
+    <dgm:linClrLst meth="repeat">
+      <a:schemeClr val="accent1">
+        <a:shade val="60000"/>
+      </a:schemeClr>
+    </dgm:linClrLst>
+    <dgm:effectClrLst/>
+    <dgm:txLinClrLst/>
+    <dgm:txFillClrLst meth="repeat">
+      <a:schemeClr val="tx1"/>
+    </dgm:txFillClrLst>
+    <dgm:txEffectClrLst/>
+  </dgm:styleLbl>
+  <dgm:styleLbl name="parChTrans1D2">
+    <dgm:fillClrLst meth="repeat">
+      <a:schemeClr val="accent1"/>
+    </dgm:fillClrLst>
+    <dgm:linClrLst meth="repeat">
+      <a:schemeClr val="accent1">
+        <a:shade val="60000"/>
+      </a:schemeClr>
+    </dgm:linClrLst>
+    <dgm:effectClrLst/>
+    <dgm:txLinClrLst/>
+    <dgm:txFillClrLst meth="repeat">
+      <a:schemeClr val="tx1"/>
+    </dgm:txFillClrLst>
+    <dgm:txEffectClrLst/>
+  </dgm:styleLbl>
+  <dgm:styleLbl name="parChTrans1D3">
+    <dgm:fillClrLst meth="repeat">
+      <a:schemeClr val="accent1"/>
+    </dgm:fillClrLst>
+    <dgm:linClrLst meth="repeat">
+      <a:schemeClr val="accent1">
+        <a:shade val="80000"/>
+      </a:schemeClr>
+    </dgm:linClrLst>
+    <dgm:effectClrLst/>
+    <dgm:txLinClrLst/>
+    <dgm:txFillClrLst meth="repeat">
+      <a:schemeClr val="tx1"/>
+    </dgm:txFillClrLst>
+    <dgm:txEffectClrLst/>
+  </dgm:styleLbl>
+  <dgm:styleLbl name="parChTrans1D4">
+    <dgm:fillClrLst meth="repeat">
+      <a:schemeClr val="accent1"/>
+    </dgm:fillClrLst>
+    <dgm:linClrLst meth="repeat">
+      <a:schemeClr val="accent1">
+        <a:shade val="80000"/>
+      </a:schemeClr>
+    </dgm:linClrLst>
+    <dgm:effectClrLst/>
+    <dgm:txLinClrLst/>
+    <dgm:txFillClrLst meth="repeat">
+      <a:schemeClr val="tx1"/>
+    </dgm:txFillClrLst>
+    <dgm:txEffectClrLst/>
+  </dgm:styleLbl>
+  <dgm:styleLbl name="fgAcc1">
+    <dgm:fillClrLst meth="repeat">
+      <a:schemeClr val="lt1">
+        <a:alpha val="90000"/>
+      </a:schemeClr>
+    </dgm:fillClrLst>
+    <dgm:linClrLst meth="repeat">
+      <a:schemeClr val="accent1"/>
+    </dgm:linClrLst>
+    <dgm:effectClrLst/>
+    <dgm:txLinClrLst/>
+    <dgm:txFillClrLst meth="repeat">
+      <a:schemeClr val="dk1"/>
+    </dgm:txFillClrLst>
+    <dgm:txEffectClrLst/>
+  </dgm:styleLbl>
+  <dgm:styleLbl name="conFgAcc1">
+    <dgm:fillClrLst meth="repeat">
+      <a:schemeClr val="lt1">
+        <a:alpha val="90000"/>
+      </a:schemeClr>
+    </dgm:fillClrLst>
+    <dgm:linClrLst meth="repeat">
+      <a:schemeClr val="accent1"/>
+    </dgm:linClrLst>
+    <dgm:effectClrLst/>
+    <dgm:txLinClrLst/>
+    <dgm:txFillClrLst meth="repeat">
+      <a:schemeClr val="dk1"/>
+    </dgm:txFillClrLst>
+    <dgm:txEffectClrLst/>
+  </dgm:styleLbl>
+  <dgm:styleLbl name="alignAcc1">
+    <dgm:fillClrLst meth="repeat">
+      <a:schemeClr val="lt1">
+        <a:alpha val="90000"/>
+      </a:schemeClr>
+    </dgm:fillClrLst>
+    <dgm:linClrLst meth="repeat">
+      <a:schemeClr val="accent1"/>
+    </dgm:linClrLst>
+    <dgm:effectClrLst/>
+    <dgm:txLinClrLst/>
+    <dgm:txFillClrLst meth="repeat">
+      <a:schemeClr val="dk1"/>
+    </dgm:txFillClrLst>
+    <dgm:txEffectClrLst/>
+  </dgm:styleLbl>
+  <dgm:styleLbl name="trAlignAcc1">
+    <dgm:fillClrLst meth="repeat">
+      <a:schemeClr val="lt1">
+        <a:alpha val="40000"/>
+      </a:schemeClr>
+    </dgm:fillClrLst>
+    <dgm:linClrLst meth="repeat">
+      <a:schemeClr val="accent1"/>
+    </dgm:linClrLst>
+    <dgm:effectClrLst/>
+    <dgm:txLinClrLst/>
+    <dgm:txFillClrLst meth="repeat">
+      <a:schemeClr val="dk1"/>
+    </dgm:txFillClrLst>
+    <dgm:txEffectClrLst/>
+  </dgm:styleLbl>
+  <dgm:styleLbl name="bgAcc1">
+    <dgm:fillClrLst meth="repeat">
+      <a:schemeClr val="lt1">
+        <a:alpha val="90000"/>
+      </a:schemeClr>
+    </dgm:fillClrLst>
+    <dgm:linClrLst meth="repeat">
+      <a:schemeClr val="accent1"/>
+    </dgm:linClrLst>
+    <dgm:effectClrLst/>
+    <dgm:txLinClrLst/>
+    <dgm:txFillClrLst meth="repeat">
+      <a:schemeClr val="dk1"/>
+    </dgm:txFillClrLst>
+    <dgm:txEffectClrLst/>
+  </dgm:styleLbl>
+  <dgm:styleLbl name="solidFgAcc1">
+    <dgm:fillClrLst meth="repeat">
+      <a:schemeClr val="lt1"/>
+    </dgm:fillClrLst>
+    <dgm:linClrLst meth="repeat">
+      <a:schemeClr val="accent1"/>
+    </dgm:linClrLst>
+    <dgm:effectClrLst/>
+    <dgm:txLinClrLst/>
+    <dgm:txFillClrLst meth="repeat">
+      <a:schemeClr val="dk1"/>
+    </dgm:txFillClrLst>
+    <dgm:txEffectClrLst/>
+  </dgm:styleLbl>
+  <dgm:styleLbl name="solidAlignAcc1">
+    <dgm:fillClrLst meth="repeat">
+      <a:schemeClr val="lt1"/>
+    </dgm:fillClrLst>
+    <dgm:linClrLst meth="repeat">
+      <a:schemeClr val="accent1"/>
+    </dgm:linClrLst>
+    <dgm:effectClrLst/>
+    <dgm:txLinClrLst/>
+    <dgm:txFillClrLst meth="repeat">
+      <a:schemeClr val="dk1"/>
+    </dgm:txFillClrLst>
+    <dgm:txEffectClrLst/>
+  </dgm:styleLbl>
+  <dgm:styleLbl name="solidBgAcc1">
+    <dgm:fillClrLst meth="repeat">
+      <a:schemeClr val="lt1"/>
+    </dgm:fillClrLst>
+    <dgm:linClrLst meth="repeat">
+      <a:schemeClr val="accent1"/>
+    </dgm:linClrLst>
+    <dgm:effectClrLst/>
+    <dgm:txLinClrLst/>
+    <dgm:txFillClrLst meth="repeat">
+      <a:schemeClr val="dk1"/>
+    </dgm:txFillClrLst>
+    <dgm:txEffectClrLst/>
+  </dgm:styleLbl>
+  <dgm:styleLbl name="fgAccFollowNode1">
+    <dgm:fillClrLst meth="repeat">
+      <a:schemeClr val="accent1">
+        <a:alpha val="90000"/>
+        <a:tint val="40000"/>
+      </a:schemeClr>
+    </dgm:fillClrLst>
+    <dgm:linClrLst meth="repeat">
+      <a:schemeClr val="accent1">
+        <a:alpha val="90000"/>
+        <a:tint val="40000"/>
+      </a:schemeClr>
+    </dgm:linClrLst>
+    <dgm:effectClrLst/>
+    <dgm:txLinClrLst/>
+    <dgm:txFillClrLst meth="repeat">
+      <a:schemeClr val="dk1"/>
+    </dgm:txFillClrLst>
+    <dgm:txEffectClrLst/>
+  </dgm:styleLbl>
+  <dgm:styleLbl name="alignAccFollowNode1">
+    <dgm:fillClrLst meth="repeat">
+      <a:schemeClr val="accent1">
+        <a:alpha val="90000"/>
+        <a:tint val="40000"/>
+      </a:schemeClr>
+    </dgm:fillClrLst>
+    <dgm:linClrLst meth="repeat">
+      <a:schemeClr val="accent1">
+        <a:alpha val="90000"/>
+        <a:tint val="40000"/>
+      </a:schemeClr>
+    </dgm:linClrLst>
+    <dgm:effectClrLst/>
+    <dgm:txLinClrLst/>
+    <dgm:txFillClrLst meth="repeat">
+      <a:schemeClr val="dk1"/>
+    </dgm:txFillClrLst>
+    <dgm:txEffectClrLst/>
+  </dgm:styleLbl>
+  <dgm:styleLbl name="bgAccFollowNode1">
+    <dgm:fillClrLst meth="repeat">
+      <a:schemeClr val="accent1">
+        <a:alpha val="90000"/>
+        <a:tint val="40000"/>
+      </a:schemeClr>
+    </dgm:fillClrLst>
+    <dgm:linClrLst meth="repeat">
+      <a:schemeClr val="accent1">
+        <a:alpha val="90000"/>
+        <a:tint val="40000"/>
+      </a:schemeClr>
+    </dgm:linClrLst>
+    <dgm:effectClrLst/>
+    <dgm:txLinClrLst/>
+    <dgm:txFillClrLst meth="repeat">
+      <a:schemeClr val="dk1"/>
+    </dgm:txFillClrLst>
+    <dgm:txEffectClrLst/>
+  </dgm:styleLbl>
+  <dgm:styleLbl name="fgAcc0">
+    <dgm:fillClrLst meth="repeat">
+      <a:schemeClr val="lt1">
+        <a:alpha val="90000"/>
+      </a:schemeClr>
+    </dgm:fillClrLst>
+    <dgm:linClrLst meth="repeat">
+      <a:schemeClr val="accent1"/>
+    </dgm:linClrLst>
+    <dgm:effectClrLst/>
+    <dgm:txLinClrLst/>
+    <dgm:txFillClrLst meth="repeat">
+      <a:schemeClr val="dk1"/>
+    </dgm:txFillClrLst>
+    <dgm:txEffectClrLst/>
+  </dgm:styleLbl>
+  <dgm:styleLbl name="fgAcc2">
+    <dgm:fillClrLst meth="repeat">
+      <a:schemeClr val="lt1">
+        <a:alpha val="90000"/>
+      </a:schemeClr>
+    </dgm:fillClrLst>
+    <dgm:linClrLst meth="repeat">
+      <a:schemeClr val="accent1"/>
+    </dgm:linClrLst>
+    <dgm:effectClrLst/>
+    <dgm:txLinClrLst/>
+    <dgm:txFillClrLst meth="repeat">
+      <a:schemeClr val="dk1"/>
+    </dgm:txFillClrLst>
+    <dgm:txEffectClrLst/>
+  </dgm:styleLbl>
+  <dgm:styleLbl name="fgAcc3">
+    <dgm:fillClrLst meth="repeat">
+      <a:schemeClr val="lt1">
+        <a:alpha val="90000"/>
+      </a:schemeClr>
+    </dgm:fillClrLst>
+    <dgm:linClrLst meth="repeat">
+      <a:schemeClr val="accent1"/>
+    </dgm:linClrLst>
+    <dgm:effectClrLst/>
+    <dgm:txLinClrLst/>
+    <dgm:txFillClrLst meth="repeat">
+      <a:schemeClr val="dk1"/>
+    </dgm:txFillClrLst>
+    <dgm:txEffectClrLst/>
+  </dgm:styleLbl>
+  <dgm:styleLbl name="fgAcc4">
+    <dgm:fillClrLst meth="repeat">
+      <a:schemeClr val="lt1">
+        <a:alpha val="90000"/>
+      </a:schemeClr>
+    </dgm:fillClrLst>
+    <dgm:linClrLst meth="repeat">
+      <a:schemeClr val="accent1"/>
+    </dgm:linClrLst>
+    <dgm:effectClrLst/>
+    <dgm:txLinClrLst/>
+    <dgm:txFillClrLst meth="repeat">
+      <a:schemeClr val="dk1"/>
+    </dgm:txFillClrLst>
+    <dgm:txEffectClrLst/>
+  </dgm:styleLbl>
+  <dgm:styleLbl name="bgShp">
+    <dgm:fillClrLst meth="repeat">
+      <a:schemeClr val="accent1">
+        <a:tint val="40000"/>
+      </a:schemeClr>
+    </dgm:fillClrLst>
+    <dgm:linClrLst meth="repeat">
+      <a:schemeClr val="accent1"/>
+    </dgm:linClrLst>
+    <dgm:effectClrLst/>
+    <dgm:txLinClrLst/>
+    <dgm:txFillClrLst meth="repeat">
+      <a:schemeClr val="dk1"/>
+    </dgm:txFillClrLst>
+    <dgm:txEffectClrLst/>
+  </dgm:styleLbl>
+  <dgm:styleLbl name="dkBgShp">
+    <dgm:fillClrLst meth="repeat">
+      <a:schemeClr val="accent1">
+        <a:shade val="80000"/>
+      </a:schemeClr>
+    </dgm:fillClrLst>
+    <dgm:linClrLst meth="repeat">
+      <a:schemeClr val="accent1"/>
+    </dgm:linClrLst>
+    <dgm:effectClrLst/>
+    <dgm:txLinClrLst/>
+    <dgm:txFillClrLst meth="repeat">
+      <a:schemeClr val="lt1"/>
+    </dgm:txFillClrLst>
+    <dgm:txEffectClrLst/>
+  </dgm:styleLbl>
+  <dgm:styleLbl name="trBgShp">
+    <dgm:fillClrLst meth="repeat">
+      <a:schemeClr val="accent1">
+        <a:tint val="50000"/>
+        <a:alpha val="40000"/>
+      </a:schemeClr>
+    </dgm:fillClrLst>
+    <dgm:linClrLst meth="repeat">
+      <a:schemeClr val="accent1"/>
+    </dgm:linClrLst>
+    <dgm:effectClrLst/>
+    <dgm:txLinClrLst/>
+    <dgm:txFillClrLst meth="repeat">
+      <a:schemeClr val="lt1"/>
+    </dgm:txFillClrLst>
+    <dgm:txEffectClrLst/>
+  </dgm:styleLbl>
+  <dgm:styleLbl name="fgShp">
+    <dgm:fillClrLst meth="repeat">
+      <a:schemeClr val="accent1">
+        <a:tint val="60000"/>
+      </a:schemeClr>
+    </dgm:fillClrLst>
+    <dgm:linClrLst meth="repeat">
+      <a:schemeClr val="lt1"/>
+    </dgm:linClrLst>
+    <dgm:effectClrLst/>
+    <dgm:txLinClrLst/>
+    <dgm:txFillClrLst meth="repeat">
+      <a:schemeClr val="dk1"/>
+    </dgm:txFillClrLst>
+    <dgm:txEffectClrLst/>
+  </dgm:styleLbl>
+  <dgm:styleLbl name="revTx">
+    <dgm:fillClrLst meth="repeat">
+      <a:schemeClr val="lt1">
+        <a:alpha val="0"/>
+      </a:schemeClr>
+    </dgm:fillClrLst>
+    <dgm:linClrLst meth="repeat">
+      <a:schemeClr val="dk1">
+        <a:alpha val="0"/>
+      </a:schemeClr>
+    </dgm:linClrLst>
+    <dgm:effectClrLst/>
+    <dgm:txLinClrLst/>
+    <dgm:txFillClrLst meth="repeat">
+      <a:schemeClr val="tx1"/>
+    </dgm:txFillClrLst>
+    <dgm:txEffectClrLst/>
+  </dgm:styleLbl>
+</dgm:colorsDef>
+</file>
+
+<file path=ppt/diagrams/data1.xml><?xml version="1.0" encoding="utf-8"?>
+<dgm:dataModel xmlns:dgm="http://schemas.openxmlformats.org/drawingml/2006/diagram" xmlns:a="http://schemas.openxmlformats.org/drawingml/2006/main">
+  <dgm:ptLst>
+    <dgm:pt modelId="{FFAF2F69-A10B-46BC-9B40-87C6DAC4B6DF}" type="doc">
+      <dgm:prSet loTypeId="urn:microsoft.com/office/officeart/2005/8/layout/target2" loCatId="relationship" qsTypeId="urn:microsoft.com/office/officeart/2005/8/quickstyle/simple1" qsCatId="simple" csTypeId="urn:microsoft.com/office/officeart/2005/8/colors/accent1_2" csCatId="accent1" phldr="1"/>
+      <dgm:spPr/>
+      <dgm:t>
+        <a:bodyPr/>
+        <a:lstStyle/>
+        <a:p>
+          <a:endParaRPr lang="en-US"/>
+        </a:p>
+      </dgm:t>
+    </dgm:pt>
+    <dgm:pt modelId="{BC48FB72-065A-49EE-811D-EB9F7A61350A}" type="pres">
+      <dgm:prSet presAssocID="{FFAF2F69-A10B-46BC-9B40-87C6DAC4B6DF}" presName="Name0" presStyleCnt="0">
+        <dgm:presLayoutVars>
+          <dgm:chMax val="3"/>
+          <dgm:chPref val="1"/>
+          <dgm:dir/>
+          <dgm:animLvl val="lvl"/>
+          <dgm:resizeHandles/>
+        </dgm:presLayoutVars>
+      </dgm:prSet>
+      <dgm:spPr/>
+    </dgm:pt>
+  </dgm:ptLst>
+  <dgm:cxnLst>
+    <dgm:cxn modelId="{7C6F8DDD-35B1-43F8-AAB8-20B3E20BB660}" type="presOf" srcId="{FFAF2F69-A10B-46BC-9B40-87C6DAC4B6DF}" destId="{BC48FB72-065A-49EE-811D-EB9F7A61350A}" srcOrd="0" destOrd="0" presId="urn:microsoft.com/office/officeart/2005/8/layout/target2"/>
+  </dgm:cxnLst>
+  <dgm:bg/>
+  <dgm:whole/>
+  <dgm:extLst>
+    <a:ext uri="http://schemas.microsoft.com/office/drawing/2008/diagram">
+      <dsp:dataModelExt xmlns:dsp="http://schemas.microsoft.com/office/drawing/2008/diagram" relId="rId6" minVer="http://schemas.openxmlformats.org/drawingml/2006/diagram"/>
+    </a:ext>
+  </dgm:extLst>
+</dgm:dataModel>
+</file>
+
+<file path=ppt/diagrams/drawing1.xml><?xml version="1.0" encoding="utf-8"?>
+<dsp:drawing xmlns:dgm="http://schemas.openxmlformats.org/drawingml/2006/diagram" xmlns:dsp="http://schemas.microsoft.com/office/drawing/2008/diagram" xmlns:a="http://schemas.openxmlformats.org/drawingml/2006/main">
+  <dsp:spTree>
+    <dsp:nvGrpSpPr>
+      <dsp:cNvPr id="0" name=""/>
+      <dsp:cNvGrpSpPr/>
+    </dsp:nvGrpSpPr>
+    <dsp:grpSpPr/>
+  </dsp:spTree>
+</dsp:drawing>
+</file>
+
+<file path=ppt/diagrams/layout1.xml><?xml version="1.0" encoding="utf-8"?>
+<dgm:layoutDef xmlns:dgm="http://schemas.openxmlformats.org/drawingml/2006/diagram" xmlns:a="http://schemas.openxmlformats.org/drawingml/2006/main" uniqueId="urn:microsoft.com/office/officeart/2005/8/layout/target2">
+  <dgm:title val=""/>
+  <dgm:desc val=""/>
+  <dgm:catLst>
+    <dgm:cat type="relationship" pri="12000"/>
+  </dgm:catLst>
+  <dgm:sampData>
+    <dgm:dataModel>
+      <dgm:ptLst>
+        <dgm:pt modelId="0" type="doc"/>
+        <dgm:pt modelId="1">
+          <dgm:prSet phldr="1"/>
+        </dgm:pt>
+        <dgm:pt modelId="11">
+          <dgm:prSet phldr="1"/>
+        </dgm:pt>
+        <dgm:pt modelId="12">
+          <dgm:prSet phldr="1"/>
+        </dgm:pt>
+        <dgm:pt modelId="2">
+          <dgm:prSet phldr="1"/>
+        </dgm:pt>
+        <dgm:pt modelId="21">
+          <dgm:prSet phldr="1"/>
+        </dgm:pt>
+        <dgm:pt modelId="22">
+          <dgm:prSet phldr="1"/>
+        </dgm:pt>
+        <dgm:pt modelId="3">
+          <dgm:prSet phldr="1"/>
+        </dgm:pt>
+        <dgm:pt modelId="31">
+          <dgm:prSet phldr="1"/>
+        </dgm:pt>
+        <dgm:pt modelId="32">
+          <dgm:prSet phldr="1"/>
+        </dgm:pt>
+      </dgm:ptLst>
+      <dgm:cxnLst>
+        <dgm:cxn modelId="4" srcId="0" destId="1" srcOrd="0" destOrd="0"/>
+        <dgm:cxn modelId="5" srcId="0" destId="2" srcOrd="1" destOrd="0"/>
+        <dgm:cxn modelId="6" srcId="0" destId="3" srcOrd="2" destOrd="0"/>
+        <dgm:cxn modelId="13" srcId="1" destId="11" srcOrd="0" destOrd="0"/>
+        <dgm:cxn modelId="14" srcId="1" destId="12" srcOrd="1" destOrd="0"/>
+        <dgm:cxn modelId="23" srcId="2" destId="21" srcOrd="0" destOrd="0"/>
+        <dgm:cxn modelId="24" srcId="2" destId="22" srcOrd="1" destOrd="0"/>
+        <dgm:cxn modelId="33" srcId="3" destId="31" srcOrd="0" destOrd="0"/>
+        <dgm:cxn modelId="34" srcId="3" destId="32" srcOrd="1" destOrd="0"/>
+      </dgm:cxnLst>
+      <dgm:bg/>
+      <dgm:whole/>
+    </dgm:dataModel>
+  </dgm:sampData>
+  <dgm:styleData>
+    <dgm:dataModel>
+      <dgm:ptLst>
+        <dgm:pt modelId="0" type="doc"/>
+        <dgm:pt modelId="1"/>
+        <dgm:pt modelId="11"/>
+        <dgm:pt modelId="2"/>
+        <dgm:pt modelId="21"/>
+      </dgm:ptLst>
+      <dgm:cxnLst>
+        <dgm:cxn modelId="4" srcId="0" destId="1" srcOrd="0" destOrd="0"/>
+        <dgm:cxn modelId="5" srcId="0" destId="2" srcOrd="1" destOrd="0"/>
+        <dgm:cxn modelId="13" srcId="1" destId="11" srcOrd="0" destOrd="0"/>
+        <dgm:cxn modelId="23" srcId="2" destId="21" srcOrd="0" destOrd="0"/>
+      </dgm:cxnLst>
+      <dgm:bg/>
+      <dgm:whole/>
+    </dgm:dataModel>
+  </dgm:styleData>
+  <dgm:clrData>
+    <dgm:dataModel>
+      <dgm:ptLst>
+        <dgm:pt modelId="0" type="doc"/>
+        <dgm:pt modelId="1"/>
+        <dgm:pt modelId="11"/>
+        <dgm:pt modelId="2"/>
+        <dgm:pt modelId="21"/>
+        <dgm:pt modelId="3"/>
+        <dgm:pt modelId="31"/>
+        <dgm:pt modelId="4"/>
+        <dgm:pt modelId="41"/>
+      </dgm:ptLst>
+      <dgm:cxnLst>
+        <dgm:cxn modelId="5" srcId="0" destId="1" srcOrd="0" destOrd="0"/>
+        <dgm:cxn modelId="6" srcId="0" destId="2" srcOrd="1" destOrd="0"/>
+        <dgm:cxn modelId="7" srcId="0" destId="3" srcOrd="2" destOrd="0"/>
+        <dgm:cxn modelId="8" srcId="0" destId="4" srcOrd="3" destOrd="0"/>
+        <dgm:cxn modelId="13" srcId="1" destId="11" srcOrd="0" destOrd="0"/>
+        <dgm:cxn modelId="23" srcId="2" destId="21" srcOrd="0" destOrd="0"/>
+        <dgm:cxn modelId="33" srcId="3" destId="31" srcOrd="0" destOrd="0"/>
+        <dgm:cxn modelId="43" srcId="4" destId="41" srcOrd="0" destOrd="0"/>
+      </dgm:cxnLst>
+      <dgm:bg/>
+      <dgm:whole/>
+    </dgm:dataModel>
+  </dgm:clrData>
+  <dgm:layoutNode name="Name0">
+    <dgm:varLst>
+      <dgm:chMax val="3"/>
+      <dgm:chPref val="1"/>
+      <dgm:dir/>
+      <dgm:animLvl val="lvl"/>
+      <dgm:resizeHandles/>
+    </dgm:varLst>
+    <dgm:alg type="composite">
+      <dgm:param type="horzAlign" val="none"/>
+      <dgm:param type="vertAlign" val="none"/>
+    </dgm:alg>
+    <dgm:shape xmlns:r="http://schemas.openxmlformats.org/officeDocument/2006/relationships" r:blip="">
+      <dgm:adjLst/>
+    </dgm:shape>
+    <dgm:presOf/>
+    <dgm:choose name="Name1">
+      <dgm:if name="Name2" func="var" arg="dir" op="equ" val="norm">
+        <dgm:choose name="Name3">
+          <dgm:if name="Name4" axis="ch ch" ptType="node node" st="1 1" cnt="1 0" func="cnt" op="gt" val="0">
+            <dgm:choose name="Name5">
+              <dgm:if name="Name6" axis="ch ch" ptType="node node" st="2 1" cnt="1 0" func="cnt" op="gt" val="0">
+                <dgm:constrLst>
+                  <dgm:constr type="primFontSz" for="des" forName="middleBoxParent" val="65"/>
+                  <dgm:constr type="primFontSz" for="des" forName="mChild" val="65"/>
+                  <dgm:constr type="primFontSz" for="des" forName="outerBoxParent" refType="primFontSz" refFor="des" refForName="middleBoxParent" op="equ"/>
+                  <dgm:constr type="primFontSz" for="des" forName="centerBoxParent" refType="primFontSz" refFor="des" refForName="middleBoxParent" op="equ"/>
+                  <dgm:constr type="primFontSz" for="des" forName="oChild" refType="primFontSz" refFor="des" refForName="mChild" op="equ"/>
+                  <dgm:constr type="primFontSz" for="des" forName="cChild" refType="primFontSz" refFor="des" refForName="mChild" op="equ"/>
+                  <dgm:constr type="l" for="ch" forName="outerBox"/>
+                  <dgm:constr type="t" for="ch" forName="outerBox"/>
+                  <dgm:constr type="w" for="ch" forName="outerBox" refType="w"/>
+                  <dgm:constr type="h" for="ch" forName="outerBox" refType="h"/>
+                  <dgm:constr type="l" for="ch" forName="middleBox" refType="w" fact="0.2"/>
+                  <dgm:constr type="t" for="ch" forName="middleBox" refType="h" fact="0.25"/>
+                  <dgm:constr type="w" for="ch" forName="middleBox" refType="w" fact="0.775"/>
+                  <dgm:constr type="h" for="ch" forName="middleBox" refType="h" fact="0.7"/>
+                  <dgm:constr type="l" for="ch" forName="centerBox" refType="w" fact="0.395"/>
+                  <dgm:constr type="t" for="ch" forName="centerBox" refType="h" fact="0.5"/>
+                  <dgm:constr type="w" for="ch" forName="centerBox" refType="w" fact="0.555"/>
+                  <dgm:constr type="h" for="ch" forName="centerBox" refType="h" fact="0.4"/>
+                  <dgm:constr type="userA" for="des" forName="outerSibTrans" refType="w"/>
+                  <dgm:constr type="userA" for="des" forName="middleSibTrans" refType="w"/>
+                  <dgm:constr type="userA" for="des" forName="centerSibTrans" refType="w"/>
+                </dgm:constrLst>
+              </dgm:if>
+              <dgm:else name="Name7">
+                <dgm:constrLst>
+                  <dgm:constr type="primFontSz" for="des" forName="middleBoxParent" val="65"/>
+                  <dgm:constr type="primFontSz" for="des" forName="mChild" val="65"/>
+                  <dgm:constr type="primFontSz" for="des" forName="outerBoxParent" refType="primFontSz" refFor="des" refForName="middleBoxParent" op="equ"/>
+                  <dgm:constr type="primFontSz" for="des" forName="centerBoxParent" refType="primFontSz" refFor="des" refForName="middleBoxParent" op="equ"/>
+                  <dgm:constr type="primFontSz" for="des" forName="oChild" refType="primFontSz" refFor="des" refForName="mChild" op="equ"/>
+                  <dgm:constr type="primFontSz" for="des" forName="cChild" refType="primFontSz" refFor="des" refForName="mChild" op="equ"/>
+                  <dgm:constr type="l" for="ch" forName="outerBox"/>
+                  <dgm:constr type="t" for="ch" forName="outerBox"/>
+                  <dgm:constr type="w" for="ch" forName="outerBox" refType="w"/>
+                  <dgm:constr type="h" for="ch" forName="outerBox" refType="h"/>
+                  <dgm:constr type="l" for="ch" forName="middleBox" refType="w" fact="0.2"/>
+                  <dgm:constr type="t" for="ch" forName="middleBox" refType="h" fact="0.25"/>
+                  <dgm:constr type="w" for="ch" forName="middleBox" refType="w" fact="0.775"/>
+                  <dgm:constr type="h" for="ch" forName="middleBox" refType="h" fact="0.7"/>
+                  <dgm:constr type="l" for="ch" forName="centerBox" refType="w" fact="0.225"/>
+                  <dgm:constr type="t" for="ch" forName="centerBox" refType="h" fact="0.5"/>
+                  <dgm:constr type="w" for="ch" forName="centerBox" refType="w" fact="0.725"/>
+                  <dgm:constr type="h" for="ch" forName="centerBox" refType="h" fact="0.4"/>
+                  <dgm:constr type="userA" for="des" forName="outerSibTrans" refType="w"/>
+                  <dgm:constr type="userA" for="des" forName="middleSibTrans" refType="w"/>
+                  <dgm:constr type="userA" for="des" forName="centerSibTrans" refType="w"/>
+                </dgm:constrLst>
+              </dgm:else>
+            </dgm:choose>
+          </dgm:if>
+          <dgm:else name="Name8">
+            <dgm:choose name="Name9">
+              <dgm:if name="Name10" axis="ch ch" ptType="node node" st="2 1" cnt="1 0" func="cnt" op="gt" val="0">
+                <dgm:constrLst>
+                  <dgm:constr type="primFontSz" for="des" forName="middleBoxParent" val="65"/>
+                  <dgm:constr type="primFontSz" for="des" forName="mChild" val="65"/>
+                  <dgm:constr type="primFontSz" for="des" forName="outerBoxParent" refType="primFontSz" refFor="des" refForName="middleBoxParent" op="equ"/>
+                  <dgm:constr type="primFontSz" for="des" forName="centerBoxParent" refType="primFontSz" refFor="des" refForName="middleBoxParent" op="equ"/>
+                  <dgm:constr type="primFontSz" for="des" forName="oChild" refType="primFontSz" refFor="des" refForName="mChild" op="equ"/>
+                  <dgm:constr type="primFontSz" for="des" forName="cChild" refType="primFontSz" refFor="des" refForName="mChild" op="equ"/>
+                  <dgm:constr type="l" for="ch" forName="outerBox"/>
+                  <dgm:constr type="t" for="ch" forName="outerBox"/>
+                  <dgm:constr type="w" for="ch" forName="outerBox" refType="w"/>
+                  <dgm:constr type="h" for="ch" forName="outerBox" refType="h"/>
+                  <dgm:constr type="l" for="ch" forName="middleBox" refType="w" fact="0.025"/>
+                  <dgm:constr type="t" for="ch" forName="middleBox" refType="h" fact="0.25"/>
+                  <dgm:constr type="w" for="ch" forName="middleBox" refType="w" fact="0.95"/>
+                  <dgm:constr type="h" for="ch" forName="middleBox" refType="h" fact="0.7"/>
+                  <dgm:constr type="l" for="ch" forName="centerBox" refType="w" fact="0.26"/>
+                  <dgm:constr type="t" for="ch" forName="centerBox" refType="h" fact="0.5"/>
+                  <dgm:constr type="w" for="ch" forName="centerBox" refType="w" fact="0.69"/>
+                  <dgm:constr type="h" for="ch" forName="centerBox" refType="h" fact="0.4"/>
+                  <dgm:constr type="userA" for="des" forName="outerSibTrans" refType="w"/>
+                  <dgm:constr type="userA" for="des" forName="middleSibTrans" refType="w"/>
+                  <dgm:constr type="userA" for="des" forName="centerSibTrans" refType="w"/>
+                </dgm:constrLst>
+              </dgm:if>
+              <dgm:else name="Name11">
+                <dgm:constrLst>
+                  <dgm:constr type="primFontSz" for="des" forName="middleBoxParent" val="65"/>
+                  <dgm:constr type="primFontSz" for="des" forName="mChild" val="65"/>
+                  <dgm:constr type="primFontSz" for="des" forName="outerBoxParent" refType="primFontSz" refFor="des" refForName="middleBoxParent" op="equ"/>
+                  <dgm:constr type="primFontSz" for="des" forName="centerBoxParent" refType="primFontSz" refFor="des" refForName="middleBoxParent" op="equ"/>
+                  <dgm:constr type="primFontSz" for="des" forName="oChild" refType="primFontSz" refFor="des" refForName="mChild" op="equ"/>
+                  <dgm:constr type="primFontSz" for="des" forName="cChild" refType="primFontSz" refFor="des" refForName="mChild" op="equ"/>
+                  <dgm:constr type="l" for="ch" forName="outerBox"/>
+                  <dgm:constr type="t" for="ch" forName="outerBox"/>
+                  <dgm:constr type="w" for="ch" forName="outerBox" refType="w"/>
+                  <dgm:constr type="h" for="ch" forName="outerBox" refType="h"/>
+                  <dgm:constr type="l" for="ch" forName="middleBox" refType="w" fact="0.025"/>
+                  <dgm:constr type="t" for="ch" forName="middleBox" refType="h" fact="0.25"/>
+                  <dgm:constr type="w" for="ch" forName="middleBox" refType="w" fact="0.95"/>
+                  <dgm:constr type="h" for="ch" forName="middleBox" refType="h" fact="0.7"/>
+                  <dgm:constr type="l" for="ch" forName="centerBox" refType="w" fact="0.05"/>
+                  <dgm:constr type="t" for="ch" forName="centerBox" refType="h" fact="0.5"/>
+                  <dgm:constr type="w" for="ch" forName="centerBox" refType="w" fact="0.9"/>
+                  <dgm:constr type="h" for="ch" forName="centerBox" refType="h" fact="0.4"/>
+                  <dgm:constr type="userA" for="des" forName="outerSibTrans" refType="w"/>
+                  <dgm:constr type="userA" for="des" forName="middleSibTrans" refType="w"/>
+                  <dgm:constr type="userA" for="des" forName="centerSibTrans" refType="w"/>
+                </dgm:constrLst>
+              </dgm:else>
+            </dgm:choose>
+          </dgm:else>
+        </dgm:choose>
+      </dgm:if>
+      <dgm:else name="Name12">
+        <dgm:choose name="Name13">
+          <dgm:if name="Name14" axis="ch ch" ptType="node node" st="1 1" cnt="1 0" func="cnt" op="gt" val="0">
+            <dgm:choose name="Name15">
+              <dgm:if name="Name16" axis="ch ch" ptType="node node" st="2 1" cnt="1 0" func="cnt" op="gt" val="0">
+                <dgm:constrLst>
+                  <dgm:constr type="primFontSz" for="des" forName="middleBoxParent" val="65"/>
+                  <dgm:constr type="primFontSz" for="des" forName="mChild" val="65"/>
+                  <dgm:constr type="primFontSz" for="des" forName="outerBoxParent" refType="primFontSz" refFor="des" refForName="middleBoxParent" op="equ"/>
+                  <dgm:constr type="primFontSz" for="des" forName="centerBoxParent" refType="primFontSz" refFor="des" refForName="middleBoxParent" op="equ"/>
+                  <dgm:constr type="primFontSz" for="des" forName="oChild" refType="primFontSz" refFor="des" refForName="mChild" op="equ"/>
+                  <dgm:constr type="primFontSz" for="des" forName="cChild" refType="primFontSz" refFor="des" refForName="mChild" op="equ"/>
+                  <dgm:constr type="l" for="ch" forName="outerBox"/>
+                  <dgm:constr type="t" for="ch" forName="outerBox"/>
+                  <dgm:constr type="w" for="ch" forName="outerBox" refType="w"/>
+                  <dgm:constr type="h" for="ch" forName="outerBox" refType="h"/>
+                  <dgm:constr type="l" for="ch" forName="middleBox" refType="w" fact="0.025"/>
+                  <dgm:constr type="t" for="ch" forName="middleBox" refType="h" fact="0.25"/>
+                  <dgm:constr type="w" for="ch" forName="middleBox" refType="w" fact="0.775"/>
+                  <dgm:constr type="h" for="ch" forName="middleBox" refType="h" fact="0.7"/>
+                  <dgm:constr type="l" for="ch" forName="centerBox" refType="w" fact="0.05"/>
+                  <dgm:constr type="t" for="ch" forName="centerBox" refType="h" fact="0.5"/>
+                  <dgm:constr type="w" for="ch" forName="centerBox" refType="w" fact="0.55"/>
+                  <dgm:constr type="h" for="ch" forName="centerBox" refType="h" fact="0.4"/>
+                  <dgm:constr type="userA" for="des" forName="outerSibTrans" refType="w"/>
+                  <dgm:constr type="userA" for="des" forName="middleSibTrans" refType="w"/>
+                  <dgm:constr type="userA" for="des" forName="centerSibTrans" refType="w"/>
+                </dgm:constrLst>
+              </dgm:if>
+              <dgm:else name="Name17">
+                <dgm:constrLst>
+                  <dgm:constr type="primFontSz" for="des" forName="middleBoxParent" val="65"/>
+                  <dgm:constr type="primFontSz" for="des" forName="mChild" val="65"/>
+                  <dgm:constr type="primFontSz" for="des" forName="outerBoxParent" refType="primFontSz" refFor="des" refForName="middleBoxParent" op="equ"/>
+                  <dgm:constr type="primFontSz" for="des" forName="centerBoxParent" refType="primFontSz" refFor="des" refForName="middleBoxParent" op="equ"/>
+                  <dgm:constr type="primFontSz" for="des" forName="oChild" refType="primFontSz" refFor="des" refForName="mChild" op="equ"/>
+                  <dgm:constr type="primFontSz" for="des" forName="cChild" refType="primFontSz" refFor="des" refForName="mChild" op="equ"/>
+                  <dgm:constr type="l" for="ch" forName="outerBox"/>
+                  <dgm:constr type="t" for="ch" forName="outerBox"/>
+                  <dgm:constr type="w" for="ch" forName="outerBox" refType="w"/>
+                  <dgm:constr type="h" for="ch" forName="outerBox" refType="h"/>
+                  <dgm:constr type="l" for="ch" forName="middleBox" refType="w" fact="0.025"/>
+                  <dgm:constr type="t" for="ch" forName="middleBox" refType="h" fact="0.25"/>
+                  <dgm:constr type="w" for="ch" forName="middleBox" refType="w" fact="0.775"/>
+                  <dgm:constr type="h" for="ch" forName="middleBox" refType="h" fact="0.7"/>
+                  <dgm:constr type="l" for="ch" forName="centerBox" refType="w" fact="0.05"/>
+                  <dgm:constr type="t" for="ch" forName="centerBox" refType="h" fact="0.5"/>
+                  <dgm:constr type="w" for="ch" forName="centerBox" refType="w" fact="0.725"/>
+                  <dgm:constr type="h" for="ch" forName="centerBox" refType="h" fact="0.4"/>
+                  <dgm:constr type="userA" for="des" forName="outerSibTrans" refType="w"/>
+                  <dgm:constr type="userA" for="des" forName="middleSibTrans" refType="w"/>
+                  <dgm:constr type="userA" for="des" forName="centerSibTrans" refType="w"/>
+                </dgm:constrLst>
+              </dgm:else>
+            </dgm:choose>
+          </dgm:if>
+          <dgm:else name="Name18">
+            <dgm:choose name="Name19">
+              <dgm:if name="Name20" axis="ch ch" ptType="node node" st="2 1" cnt="1 0" func="cnt" op="gt" val="0">
+                <dgm:constrLst>
+                  <dgm:constr type="primFontSz" for="des" forName="middleBoxParent" val="65"/>
+                  <dgm:constr type="primFontSz" for="des" forName="mChild" val="65"/>
+                  <dgm:constr type="primFontSz" for="des" forName="outerBoxParent" refType="primFontSz" refFor="des" refForName="middleBoxParent" op="equ"/>
+                  <dgm:constr type="primFontSz" for="des" forName="centerBoxParent" refType="primFontSz" refFor="des" refForName="middleBoxParent" op="equ"/>
+                  <dgm:constr type="primFontSz" for="des" forName="oChild" refType="primFontSz" refFor="des" refForName="mChild" op="equ"/>
+                  <dgm:constr type="primFontSz" for="des" forName="cChild" refType="primFontSz" refFor="des" refForName="mChild" op="equ"/>
+                  <dgm:constr type="l" for="ch" forName="outerBox"/>
+                  <dgm:constr type="t" for="ch" forName="outerBox"/>
+                  <dgm:constr type="w" for="ch" forName="outerBox" refType="w"/>
+                  <dgm:constr type="h" for="ch" forName="outerBox" refType="h"/>
+                  <dgm:constr type="l" for="ch" forName="middleBox" refType="w" fact="0.025"/>
+                  <dgm:constr type="t" for="ch" forName="middleBox" refType="h" fact="0.25"/>
+                  <dgm:constr type="w" for="ch" forName="middleBox" refType="w" fact="0.95"/>
+                  <dgm:constr type="h" for="ch" forName="middleBox" refType="h" fact="0.7"/>
+                  <dgm:constr type="l" for="ch" forName="centerBox" refType="w" fact="0.05"/>
+                  <dgm:constr type="t" for="ch" forName="centerBox" refType="h" fact="0.5"/>
+                  <dgm:constr type="w" for="ch" forName="centerBox" refType="w" fact="0.69"/>
+                  <dgm:constr type="h" for="ch" forName="centerBox" refType="h" fact="0.4"/>
+                  <dgm:constr type="userA" for="des" forName="outerSibTrans" refType="w"/>
+                  <dgm:constr type="userA" for="des" forName="middleSibTrans" refType="w"/>
+                  <dgm:constr type="userA" for="des" forName="centerSibTrans" refType="w"/>
+                </dgm:constrLst>
+              </dgm:if>
+              <dgm:else name="Name21">
+                <dgm:constrLst>
+                  <dgm:constr type="primFontSz" for="des" forName="middleBoxParent" val="65"/>
+                  <dgm:constr type="primFontSz" for="des" forName="mChild" val="65"/>
+                  <dgm:constr type="primFontSz" for="des" forName="outerBoxParent" refType="primFontSz" refFor="des" refForName="middleBoxParent" op="equ"/>
+                  <dgm:constr type="primFontSz" for="des" forName="centerBoxParent" refType="primFontSz" refFor="des" refForName="middleBoxParent" op="equ"/>
+                  <dgm:constr type="primFontSz" for="des" forName="oChild" refType="primFontSz" refFor="des" refForName="mChild" op="equ"/>
+                  <dgm:constr type="primFontSz" for="des" forName="cChild" refType="primFontSz" refFor="des" refForName="mChild" op="equ"/>
+                  <dgm:constr type="l" for="ch" forName="outerBox"/>
+                  <dgm:constr type="t" for="ch" forName="outerBox"/>
+                  <dgm:constr type="w" for="ch" forName="outerBox" refType="w"/>
+                  <dgm:constr type="h" for="ch" forName="outerBox" refType="h"/>
+                  <dgm:constr type="l" for="ch" forName="middleBox" refType="w" fact="0.025"/>
+                  <dgm:constr type="t" for="ch" forName="middleBox" refType="h" fact="0.25"/>
+                  <dgm:constr type="w" for="ch" forName="middleBox" refType="w" fact="0.95"/>
+                  <dgm:constr type="h" for="ch" forName="middleBox" refType="h" fact="0.7"/>
+                  <dgm:constr type="l" for="ch" forName="centerBox" refType="w" fact="0.05"/>
+                  <dgm:constr type="t" for="ch" forName="centerBox" refType="h" fact="0.5"/>
+                  <dgm:constr type="w" for="ch" forName="centerBox" refType="w" fact="0.9"/>
+                  <dgm:constr type="h" for="ch" forName="centerBox" refType="h" fact="0.4"/>
+                  <dgm:constr type="userA" for="des" forName="outerSibTrans" refType="w"/>
+                  <dgm:constr type="userA" for="des" forName="middleSibTrans" refType="w"/>
+                  <dgm:constr type="userA" for="des" forName="centerSibTrans" refType="w"/>
+                </dgm:constrLst>
+              </dgm:else>
+            </dgm:choose>
+          </dgm:else>
+        </dgm:choose>
+      </dgm:else>
+    </dgm:choose>
+    <dgm:ruleLst/>
+    <dgm:choose name="Name22">
+      <dgm:if name="Name23" axis="root ch" ptType="all node" st="1 1" cnt="0 0" func="cnt" op="gte" val="1">
+        <dgm:layoutNode name="outerBox" styleLbl="node1">
+          <dgm:alg type="composite">
+            <dgm:param type="horzAlign" val="none"/>
+            <dgm:param type="vertAlign" val="none"/>
+          </dgm:alg>
+          <dgm:shape xmlns:r="http://schemas.openxmlformats.org/officeDocument/2006/relationships" r:blip="">
+            <dgm:adjLst/>
+          </dgm:shape>
+          <dgm:presOf/>
+          <dgm:choose name="Name24">
+            <dgm:if name="Name25" axis="root ch" ptType="all node" st="1 1" cnt="0 0" func="cnt" op="gt" val="1">
+              <dgm:choose name="Name26">
+                <dgm:if name="Name27" func="var" arg="dir" op="equ" val="norm">
+                  <dgm:constrLst>
+                    <dgm:constr type="l" for="ch" forName="outerBoxParent"/>
+                    <dgm:constr type="t" for="ch" forName="outerBoxParent"/>
+                    <dgm:constr type="w" for="ch" forName="outerBoxParent" refType="w"/>
+                    <dgm:constr type="h" for="ch" forName="outerBoxParent" refType="h"/>
+                    <dgm:constr type="bMarg" for="ch" forName="outerBoxParent" refType="h" fact="2.2"/>
+                    <dgm:constr type="l" for="ch" forName="outerBoxChildren" refType="w" fact="0.025"/>
+                    <dgm:constr type="t" for="ch" forName="outerBoxChildren" refType="h" fact="0.25"/>
+                    <dgm:constr type="w" for="ch" forName="outerBoxChildren" refType="w" fact="0.15"/>
+                    <dgm:constr type="h" for="ch" forName="outerBoxChildren" refType="h" fact="0.7"/>
+                  </dgm:constrLst>
+                </dgm:if>
+                <dgm:else name="Name28">
+                  <dgm:constrLst>
+                    <dgm:constr type="l" for="ch" forName="outerBoxParent"/>
+                    <dgm:constr type="t" for="ch" forName="outerBoxParent"/>
+                    <dgm:constr type="w" for="ch" forName="outerBoxParent" refType="w"/>
+                    <dgm:constr type="h" for="ch" forName="outerBoxParent" refType="h"/>
+                    <dgm:constr type="bMarg" for="ch" forName="outerBoxParent" refType="h" fact="2.2"/>
+                    <dgm:constr type="l" for="ch" forName="outerBoxChildren" refType="w" fact="0.825"/>
+                    <dgm:constr type="t" for="ch" forName="outerBoxChildren" refType="h" fact="0.25"/>
+                    <dgm:constr type="w" for="ch" forName="outerBoxChildren" refType="w" fact="0.15"/>
+                    <dgm:constr type="h" for="ch" forName="outerBoxChildren" refType="h" fact="0.7"/>
+                  </dgm:constrLst>
+                </dgm:else>
+              </dgm:choose>
+            </dgm:if>
+            <dgm:else name="Name29">
+              <dgm:constrLst>
+                <dgm:constr type="l" for="ch" forName="outerBoxParent"/>
+                <dgm:constr type="t" for="ch" forName="outerBoxParent"/>
+                <dgm:constr type="w" for="ch" forName="outerBoxParent" refType="w"/>
+                <dgm:constr type="h" for="ch" forName="outerBoxParent" refType="h"/>
+                <dgm:constr type="bMarg" for="ch" forName="outerBoxParent" refType="h" fact="1.75"/>
+                <dgm:constr type="l" for="ch" forName="outerBoxChildren" refType="w" fact="0.025"/>
+                <dgm:constr type="t" for="ch" forName="outerBoxChildren" refType="h" fact="0.45"/>
+                <dgm:constr type="w" for="ch" forName="outerBoxChildren" refType="w" fact="0.95"/>
+                <dgm:constr type="h" for="ch" forName="outerBoxChildren" refType="h" fact="0.45"/>
+              </dgm:constrLst>
+            </dgm:else>
+          </dgm:choose>
+          <dgm:ruleLst/>
+          <dgm:layoutNode name="outerBoxParent" styleLbl="node1">
+            <dgm:alg type="tx">
+              <dgm:param type="txAnchorVert" val="t"/>
+              <dgm:param type="parTxLTRAlign" val="l"/>
+              <dgm:param type="parTxRTLAlign" val="r"/>
+            </dgm:alg>
+            <dgm:shape xmlns:r="http://schemas.openxmlformats.org/officeDocument/2006/relationships" type="roundRect" r:blip="">
+              <dgm:adjLst>
+                <dgm:adj idx="1" val="0.085"/>
+              </dgm:adjLst>
+            </dgm:shape>
+            <dgm:presOf axis="ch" ptType="node" cnt="1"/>
+            <dgm:constrLst>
+              <dgm:constr type="tMarg" refType="primFontSz" fact="0.3"/>
+              <dgm:constr type="lMarg" refType="primFontSz" fact="0.3"/>
+              <dgm:constr type="rMarg" refType="primFontSz" fact="0.3"/>
+            </dgm:constrLst>
+            <dgm:ruleLst>
+              <dgm:rule type="primFontSz" val="5" fact="NaN" max="NaN"/>
+            </dgm:ruleLst>
+          </dgm:layoutNode>
+          <dgm:layoutNode name="outerBoxChildren">
+            <dgm:choose name="Name30">
+              <dgm:if name="Name31" axis="root ch" ptType="all node" st="1 1" cnt="0 0" func="cnt" op="gt" val="1">
+                <dgm:alg type="lin">
+                  <dgm:param type="linDir" val="fromT"/>
+                  <dgm:param type="vertAlign" val="t"/>
+                </dgm:alg>
+              </dgm:if>
+              <dgm:else name="Name32">
+                <dgm:choose name="Name33">
+                  <dgm:if name="Name34" func="var" arg="dir" op="equ" val="norm">
+                    <dgm:alg type="lin">
+                      <dgm:param type="horzAlign" val="l"/>
+                    </dgm:alg>
+                  </dgm:if>
+                  <dgm:else name="Name35">
+                    <dgm:alg type="lin">
+                      <dgm:param type="linDir" val="fromR"/>
+                      <dgm:param type="horzAlign" val="r"/>
+                    </dgm:alg>
+                  </dgm:else>
+                </dgm:choose>
+              </dgm:else>
+            </dgm:choose>
+            <dgm:shape xmlns:r="http://schemas.openxmlformats.org/officeDocument/2006/relationships" r:blip="">
+              <dgm:adjLst/>
+            </dgm:shape>
+            <dgm:presOf/>
+            <dgm:constrLst>
+              <dgm:constr type="w" for="ch" forName="oChild" refType="w"/>
+              <dgm:constr type="h" for="ch" forName="oChild" refType="h"/>
+            </dgm:constrLst>
+            <dgm:ruleLst/>
+            <dgm:forEach name="Name36" axis="ch ch" ptType="node node" st="1 1" cnt="1 0">
+              <dgm:layoutNode name="oChild" styleLbl="fgAcc1">
+                <dgm:varLst>
+                  <dgm:bulletEnabled val="1"/>
+                </dgm:varLst>
+                <dgm:alg type="tx"/>
+                <dgm:shape xmlns:r="http://schemas.openxmlformats.org/officeDocument/2006/relationships" type="roundRect" r:blip="">
+                  <dgm:adjLst>
+                    <dgm:adj idx="1" val="0.105"/>
+                  </dgm:adjLst>
+                </dgm:shape>
+                <dgm:presOf axis="desOrSelf" ptType="node"/>
+                <dgm:constrLst>
+                  <dgm:constr type="tMarg" refType="primFontSz" fact="0.3"/>
+                  <dgm:constr type="bMarg" refType="primFontSz" fact="0.3"/>
+                  <dgm:constr type="lMarg" refType="primFontSz" fact="0.3"/>
+                  <dgm:constr type="rMarg" refType="primFontSz" fact="0.3"/>
+                </dgm:constrLst>
+                <dgm:ruleLst>
+                  <dgm:rule type="primFontSz" val="5" fact="NaN" max="NaN"/>
+                </dgm:ruleLst>
+              </dgm:layoutNode>
+              <dgm:forEach name="Name37" axis="followSib" ptType="sibTrans" cnt="1">
+                <dgm:layoutNode name="outerSibTrans">
+                  <dgm:alg type="sp"/>
+                  <dgm:shape xmlns:r="http://schemas.openxmlformats.org/officeDocument/2006/relationships" r:blip="">
+                    <dgm:adjLst/>
+                  </dgm:shape>
+                  <dgm:presOf/>
+                  <dgm:constrLst>
+                    <dgm:constr type="userA"/>
+                    <dgm:constr type="w" refType="userA" fact="0.015"/>
+                    <dgm:constr type="h" refType="userA" fact="0.015"/>
+                  </dgm:constrLst>
+                  <dgm:ruleLst/>
+                </dgm:layoutNode>
+              </dgm:forEach>
+            </dgm:forEach>
+          </dgm:layoutNode>
+        </dgm:layoutNode>
+      </dgm:if>
+      <dgm:else name="Name38"/>
+    </dgm:choose>
+    <dgm:choose name="Name39">
+      <dgm:if name="Name40" axis="root ch" ptType="all node" st="1 1" cnt="0 0" func="cnt" op="gte" val="2">
+        <dgm:layoutNode name="middleBox">
+          <dgm:alg type="composite">
+            <dgm:param type="horzAlign" val="none"/>
+            <dgm:param type="vertAlign" val="none"/>
+          </dgm:alg>
+          <dgm:shape xmlns:r="http://schemas.openxmlformats.org/officeDocument/2006/relationships" r:blip="">
+            <dgm:adjLst/>
+          </dgm:shape>
+          <dgm:presOf/>
+          <dgm:choose name="Name41">
+            <dgm:if name="Name42" axis="root ch" ptType="all node" st="1 1" cnt="0 0" func="cnt" op="gt" val="2">
+              <dgm:choose name="Name43">
+                <dgm:if name="Name44" func="var" arg="dir" op="equ" val="norm">
+                  <dgm:constrLst>
+                    <dgm:constr type="l" for="ch" forName="middleBoxParent"/>
+                    <dgm:constr type="t" for="ch" forName="middleBoxParent"/>
+                    <dgm:constr type="w" for="ch" forName="middleBoxParent" refType="w"/>
+                    <dgm:constr type="h" for="ch" forName="middleBoxParent" refType="h"/>
+                    <dgm:constr type="bMarg" for="ch" forName="middleBoxParent" refType="h" fact="1.8"/>
+                    <dgm:constr type="l" for="ch" forName="middleBoxChildren" refType="w" fact="0.025"/>
+                    <dgm:constr type="t" for="ch" forName="middleBoxChildren" refType="h" fact="0.35"/>
+                    <dgm:constr type="w" for="ch" forName="middleBoxChildren" refType="w" fact="0.2"/>
+                    <dgm:constr type="h" for="ch" forName="middleBoxChildren" refType="h" fact="0.575"/>
+                  </dgm:constrLst>
+                </dgm:if>
+                <dgm:else name="Name45">
+                  <dgm:constrLst>
+                    <dgm:constr type="l" for="ch" forName="middleBoxParent"/>
+                    <dgm:constr type="t" for="ch" forName="middleBoxParent"/>
+                    <dgm:constr type="w" for="ch" forName="middleBoxParent" refType="w"/>
+                    <dgm:constr type="h" for="ch" forName="middleBoxParent" refType="h"/>
+                    <dgm:constr type="bMarg" for="ch" forName="middleBoxParent" refType="h" fact="1.8"/>
+                    <dgm:constr type="l" for="ch" forName="middleBoxChildren" refType="w" fact="0.775"/>
+                    <dgm:constr type="t" for="ch" forName="middleBoxChildren" refType="h" fact="0.35"/>
+                    <dgm:constr type="w" for="ch" forName="middleBoxChildren" refType="w" fact="0.2"/>
+                    <dgm:constr type="h" for="ch" forName="middleBoxChildren" refType="h" fact="0.575"/>
+                  </dgm:constrLst>
+                </dgm:else>
+              </dgm:choose>
+            </dgm:if>
+            <dgm:else name="Name46">
+              <dgm:constrLst>
+                <dgm:constr type="l" for="ch" forName="middleBoxParent"/>
+                <dgm:constr type="t" for="ch" forName="middleBoxParent"/>
+                <dgm:constr type="w" for="ch" forName="middleBoxParent" refType="w"/>
+                <dgm:constr type="h" for="ch" forName="middleBoxParent" refType="h"/>
+                <dgm:constr type="bMarg" for="ch" forName="middleBoxParent" refType="h" fact="1.8"/>
+                <dgm:constr type="l" for="ch" forName="middleBoxChildren" refType="w" fact="0.025"/>
+                <dgm:constr type="t" for="ch" forName="middleBoxChildren" refType="h" fact="0.45"/>
+                <dgm:constr type="w" for="ch" forName="middleBoxChildren" refType="w" fact="0.95"/>
+                <dgm:constr type="h" for="ch" forName="middleBoxChildren" refType="h" fact="0.45"/>
+              </dgm:constrLst>
+            </dgm:else>
+          </dgm:choose>
+          <dgm:ruleLst/>
+          <dgm:layoutNode name="middleBoxParent" styleLbl="node1">
+            <dgm:alg type="tx">
+              <dgm:param type="txAnchorVert" val="t"/>
+              <dgm:param type="parTxLTRAlign" val="l"/>
+              <dgm:param type="parTxRTLAlign" val="r"/>
+            </dgm:alg>
+            <dgm:shape xmlns:r="http://schemas.openxmlformats.org/officeDocument/2006/relationships" type="roundRect" r:blip="">
+              <dgm:adjLst>
+                <dgm:adj idx="1" val="0.105"/>
+              </dgm:adjLst>
+            </dgm:shape>
+            <dgm:presOf axis="ch" ptType="node" st="2" cnt="1"/>
+            <dgm:constrLst>
+              <dgm:constr type="tMarg" refType="primFontSz" fact="0.3"/>
+              <dgm:constr type="lMarg" refType="primFontSz" fact="0.3"/>
+              <dgm:constr type="rMarg" refType="primFontSz" fact="0.3"/>
+            </dgm:constrLst>
+            <dgm:ruleLst>
+              <dgm:rule type="primFontSz" val="5" fact="NaN" max="NaN"/>
+            </dgm:ruleLst>
+          </dgm:layoutNode>
+          <dgm:layoutNode name="middleBoxChildren">
+            <dgm:choose name="Name47">
+              <dgm:if name="Name48" axis="root ch" ptType="all node" st="1 1" cnt="0 0" func="cnt" op="gt" val="2">
+                <dgm:alg type="lin">
+                  <dgm:param type="linDir" val="fromT"/>
+                  <dgm:param type="vertAlign" val="t"/>
+                </dgm:alg>
+              </dgm:if>
+              <dgm:else name="Name49">
+                <dgm:choose name="Name50">
+                  <dgm:if name="Name51" func="var" arg="dir" op="equ" val="norm">
+                    <dgm:alg type="lin">
+                      <dgm:param type="horzAlign" val="l"/>
+                    </dgm:alg>
+                  </dgm:if>
+                  <dgm:else name="Name52">
+                    <dgm:alg type="lin">
+                      <dgm:param type="linDir" val="fromR"/>
+                      <dgm:param type="horzAlign" val="r"/>
+                    </dgm:alg>
+                  </dgm:else>
+                </dgm:choose>
+              </dgm:else>
+            </dgm:choose>
+            <dgm:shape xmlns:r="http://schemas.openxmlformats.org/officeDocument/2006/relationships" r:blip="">
+              <dgm:adjLst/>
+            </dgm:shape>
+            <dgm:presOf/>
+            <dgm:constrLst>
+              <dgm:constr type="w" for="ch" forName="mChild" refType="w"/>
+              <dgm:constr type="h" for="ch" forName="mChild" refType="h"/>
+            </dgm:constrLst>
+            <dgm:ruleLst/>
+            <dgm:forEach name="Name53" axis="ch ch" ptType="node node" st="2 1" cnt="1 0">
+              <dgm:layoutNode name="mChild" styleLbl="fgAcc1">
+                <dgm:varLst>
+                  <dgm:bulletEnabled val="1"/>
+                </dgm:varLst>
+                <dgm:alg type="tx"/>
+                <dgm:shape xmlns:r="http://schemas.openxmlformats.org/officeDocument/2006/relationships" type="roundRect" r:blip="">
+                  <dgm:adjLst>
+                    <dgm:adj idx="1" val="0.105"/>
+                  </dgm:adjLst>
+                </dgm:shape>
+                <dgm:presOf axis="desOrSelf" ptType="node"/>
+                <dgm:constrLst>
+                  <dgm:constr type="tMarg" refType="primFontSz" fact="0.3"/>
+                  <dgm:constr type="bMarg" refType="primFontSz" fact="0.3"/>
+                  <dgm:constr type="lMarg" refType="primFontSz" fact="0.3"/>
+                  <dgm:constr type="rMarg" refType="primFontSz" fact="0.3"/>
+                </dgm:constrLst>
+                <dgm:ruleLst>
+                  <dgm:rule type="primFontSz" val="5" fact="NaN" max="NaN"/>
+                </dgm:ruleLst>
+              </dgm:layoutNode>
+              <dgm:forEach name="Name54" axis="followSib" ptType="sibTrans" cnt="1">
+                <dgm:layoutNode name="middleSibTrans">
+                  <dgm:alg type="sp"/>
+                  <dgm:shape xmlns:r="http://schemas.openxmlformats.org/officeDocument/2006/relationships" r:blip="">
+                    <dgm:adjLst/>
+                  </dgm:shape>
+                  <dgm:presOf/>
+                  <dgm:constrLst>
+                    <dgm:constr type="userA"/>
+                    <dgm:constr type="w" refType="userA" fact="0.015"/>
+                    <dgm:constr type="h" refType="userA" fact="0.015"/>
+                  </dgm:constrLst>
+                  <dgm:ruleLst/>
+                </dgm:layoutNode>
+              </dgm:forEach>
+            </dgm:forEach>
+          </dgm:layoutNode>
+        </dgm:layoutNode>
+      </dgm:if>
+      <dgm:else name="Name55"/>
+    </dgm:choose>
+    <dgm:choose name="Name56">
+      <dgm:if name="Name57" axis="root ch" ptType="all node" st="1 1" cnt="0 0" func="cnt" op="gte" val="3">
+        <dgm:layoutNode name="centerBox">
+          <dgm:alg type="composite">
+            <dgm:param type="horzAlign" val="none"/>
+            <dgm:param type="vertAlign" val="none"/>
+          </dgm:alg>
+          <dgm:shape xmlns:r="http://schemas.openxmlformats.org/officeDocument/2006/relationships" r:blip="">
+            <dgm:adjLst/>
+          </dgm:shape>
+          <dgm:presOf/>
+          <dgm:choose name="Name58">
+            <dgm:if name="Name59" axis="ch ch" ptType="node node" st="3 1" cnt="1 0" func="cnt" op="gt" val="0">
+              <dgm:constrLst>
+                <dgm:constr type="l" for="ch" forName="centerBoxParent"/>
+                <dgm:constr type="t" for="ch" forName="centerBoxParent"/>
+                <dgm:constr type="w" for="ch" forName="centerBoxParent" refType="w"/>
+                <dgm:constr type="h" for="ch" forName="centerBoxParent" refType="h"/>
+                <dgm:constr type="bMarg" for="ch" forName="centerBoxParent" refType="h" fact="1.6"/>
+                <dgm:constr type="l" for="ch" forName="centerBoxChildren" refType="w" fact="0.025"/>
+                <dgm:constr type="t" for="ch" forName="centerBoxChildren" refType="h" fact="0.45"/>
+                <dgm:constr type="w" for="ch" forName="centerBoxChildren" refType="w" fact="0.95"/>
+                <dgm:constr type="h" for="ch" forName="centerBoxChildren" refType="h" fact="0.45"/>
+              </dgm:constrLst>
+            </dgm:if>
+            <dgm:else name="Name60">
+              <dgm:constrLst>
+                <dgm:constr type="l" for="ch" forName="centerBoxParent"/>
+                <dgm:constr type="t" for="ch" forName="centerBoxParent"/>
+                <dgm:constr type="w" for="ch" forName="centerBoxParent" refType="w"/>
+                <dgm:constr type="h" for="ch" forName="centerBoxParent" refType="h"/>
+              </dgm:constrLst>
+            </dgm:else>
+          </dgm:choose>
+          <dgm:ruleLst/>
+          <dgm:layoutNode name="centerBoxParent" styleLbl="node1">
+            <dgm:alg type="tx">
+              <dgm:param type="txAnchorVert" val="t"/>
+              <dgm:param type="parTxLTRAlign" val="l"/>
+              <dgm:param type="parTxRTLAlign" val="r"/>
+            </dgm:alg>
+            <dgm:shape xmlns:r="http://schemas.openxmlformats.org/officeDocument/2006/relationships" type="roundRect" r:blip="">
+              <dgm:adjLst>
+                <dgm:adj idx="1" val="0.105"/>
+              </dgm:adjLst>
+            </dgm:shape>
+            <dgm:presOf axis="ch" ptType="node" st="3" cnt="1"/>
+            <dgm:constrLst>
+              <dgm:constr type="tMarg" refType="primFontSz" fact="0.3"/>
+              <dgm:constr type="lMarg" refType="primFontSz" fact="0.3"/>
+              <dgm:constr type="rMarg" refType="primFontSz" fact="0.3"/>
+            </dgm:constrLst>
+            <dgm:ruleLst>
+              <dgm:rule type="primFontSz" val="5" fact="NaN" max="NaN"/>
+            </dgm:ruleLst>
+          </dgm:layoutNode>
+          <dgm:choose name="Name61">
+            <dgm:if name="Name62" axis="ch ch" ptType="node node" st="3 1" cnt="1 0" func="cnt" op="gt" val="0">
+              <dgm:layoutNode name="centerBoxChildren">
+                <dgm:choose name="Name63">
+                  <dgm:if name="Name64" func="var" arg="dir" op="equ" val="norm">
+                    <dgm:alg type="lin">
+                      <dgm:param type="horzAlign" val="l"/>
+                    </dgm:alg>
+                  </dgm:if>
+                  <dgm:else name="Name65">
+                    <dgm:alg type="lin">
+                      <dgm:param type="linDir" val="fromR"/>
+                      <dgm:param type="horzAlign" val="r"/>
+                    </dgm:alg>
+                  </dgm:else>
+                </dgm:choose>
+                <dgm:shape xmlns:r="http://schemas.openxmlformats.org/officeDocument/2006/relationships" r:blip="">
+                  <dgm:adjLst/>
+                </dgm:shape>
+                <dgm:presOf/>
+                <dgm:constrLst>
+                  <dgm:constr type="w" for="ch" forName="cChild" refType="w"/>
+                  <dgm:constr type="h" for="ch" forName="cChild" refType="h"/>
+                </dgm:constrLst>
+                <dgm:ruleLst/>
+                <dgm:forEach name="Name66" axis="ch ch" ptType="node node" st="3 1" cnt="1 0">
+                  <dgm:layoutNode name="cChild" styleLbl="fgAcc1">
+                    <dgm:varLst>
+                      <dgm:bulletEnabled val="1"/>
+                    </dgm:varLst>
+                    <dgm:alg type="tx"/>
+                    <dgm:shape xmlns:r="http://schemas.openxmlformats.org/officeDocument/2006/relationships" type="roundRect" r:blip="">
+                      <dgm:adjLst>
+                        <dgm:adj idx="1" val="0.105"/>
+                      </dgm:adjLst>
+                    </dgm:shape>
+                    <dgm:presOf axis="desOrSelf" ptType="node"/>
+                    <dgm:constrLst>
+                      <dgm:constr type="tMarg" refType="primFontSz" fact="0.3"/>
+                      <dgm:constr type="bMarg" refType="primFontSz" fact="0.3"/>
+                      <dgm:constr type="lMarg" refType="primFontSz" fact="0.3"/>
+                      <dgm:constr type="rMarg" refType="primFontSz" fact="0.3"/>
+                    </dgm:constrLst>
+                    <dgm:ruleLst>
+                      <dgm:rule type="primFontSz" val="5" fact="NaN" max="NaN"/>
+                    </dgm:ruleLst>
+                  </dgm:layoutNode>
+                  <dgm:forEach name="Name67" axis="followSib" ptType="sibTrans" cnt="1">
+                    <dgm:layoutNode name="centerSibTrans">
+                      <dgm:alg type="sp"/>
+                      <dgm:shape xmlns:r="http://schemas.openxmlformats.org/officeDocument/2006/relationships" r:blip="">
+                        <dgm:adjLst/>
+                      </dgm:shape>
+                      <dgm:presOf/>
+                      <dgm:constrLst>
+                        <dgm:constr type="userA"/>
+                        <dgm:constr type="w" refType="userA" fact="0.015"/>
+                        <dgm:constr type="h" refType="userA" fact="0.015"/>
+                      </dgm:constrLst>
+                      <dgm:ruleLst/>
+                    </dgm:layoutNode>
+                  </dgm:forEach>
+                </dgm:forEach>
+              </dgm:layoutNode>
+            </dgm:if>
+            <dgm:else name="Name68"/>
+          </dgm:choose>
+        </dgm:layoutNode>
+      </dgm:if>
+      <dgm:else name="Name69"/>
+    </dgm:choose>
+  </dgm:layoutNode>
+</dgm:layoutDef>
+</file>
+
+<file path=ppt/diagrams/quickStyle1.xml><?xml version="1.0" encoding="utf-8"?>
+<dgm:styleDef xmlns:dgm="http://schemas.openxmlformats.org/drawingml/2006/diagram" xmlns:a="http://schemas.openxmlformats.org/drawingml/2006/main" uniqueId="urn:microsoft.com/office/officeart/2005/8/quickstyle/simple1">
+  <dgm:title val=""/>
+  <dgm:desc val=""/>
+  <dgm:catLst>
+    <dgm:cat type="simple" pri="10100"/>
+  </dgm:catLst>
+  <dgm:scene3d>
+    <a:camera prst="orthographicFront"/>
+    <a:lightRig rig="threePt" dir="t"/>
+  </dgm:scene3d>
+  <dgm:styleLbl name="node0">
+    <dgm:scene3d>
+      <a:camera prst="orthographicFront"/>
+      <a:lightRig rig="threePt" dir="t"/>
+    </dgm:scene3d>
+    <dgm:sp3d/>
+    <dgm:txPr/>
+    <dgm:style>
+      <a:lnRef idx="2">
+        <a:scrgbClr r="0" g="0" b="0"/>
+      </a:lnRef>
+      <a:fillRef idx="1">
+        <a:scrgbClr r="0" g="0" b="0"/>
+      </a:fillRef>
+      <a:effectRef idx="0">
+        <a:scrgbClr r="0" g="0" b="0"/>
+      </a:effectRef>
+      <a:fontRef idx="minor">
+        <a:schemeClr val="lt1"/>
+      </a:fontRef>
+    </dgm:style>
+  </dgm:styleLbl>
+  <dgm:styleLbl name="lnNode1">
+    <dgm:scene3d>
+      <a:camera prst="orthographicFront"/>
+      <a:lightRig rig="threePt" dir="t"/>
+    </dgm:scene3d>
+    <dgm:sp3d/>
+    <dgm:txPr/>
+    <dgm:style>
+      <a:lnRef idx="2">
+        <a:scrgbClr r="0" g="0" b="0"/>
+      </a:lnRef>
+      <a:fillRef idx="1">
+        <a:scrgbClr r="0" g="0" b="0"/>
+      </a:fillRef>
+      <a:effectRef idx="0">
+        <a:scrgbClr r="0" g="0" b="0"/>
+      </a:effectRef>
+      <a:fontRef idx="minor">
+        <a:schemeClr val="lt1"/>
+      </a:fontRef>
+    </dgm:style>
+  </dgm:styleLbl>
+  <dgm:styleLbl name="vennNode1">
+    <dgm:scene3d>
+      <a:camera prst="orthographicFront"/>
+      <a:lightRig rig="threePt" dir="t"/>
+    </dgm:scene3d>
+    <dgm:sp3d/>
+    <dgm:txPr/>
+    <dgm:style>
+      <a:lnRef idx="2">
+        <a:scrgbClr r="0" g="0" b="0"/>
+      </a:lnRef>
+      <a:fillRef idx="1">
+        <a:scrgbClr r="0" g="0" b="0"/>
+      </a:fillRef>
+      <a:effectRef idx="0">
+        <a:scrgbClr r="0" g="0" b="0"/>
+      </a:effectRef>
+      <a:fontRef idx="minor">
+        <a:schemeClr val="tx1"/>
+      </a:fontRef>
+    </dgm:style>
+  </dgm:styleLbl>
+  <dgm:styleLbl name="alignNode1">
+    <dgm:scene3d>
+      <a:camera prst="orthographicFront"/>
+      <a:lightRig rig="threePt" dir="t"/>
+    </dgm:scene3d>
+    <dgm:sp3d/>
+    <dgm:txPr/>
+    <dgm:style>
+      <a:lnRef idx="2">
+        <a:scrgbClr r="0" g="0" b="0"/>
+      </a:lnRef>
+      <a:fillRef idx="1">
+        <a:scrgbClr r="0" g="0" b="0"/>
+      </a:fillRef>
+      <a:effectRef idx="0">
+        <a:scrgbClr r="0" g="0" b="0"/>
+      </a:effectRef>
+      <a:fontRef idx="minor">
+        <a:schemeClr val="lt1"/>
+      </a:fontRef>
+    </dgm:style>
+  </dgm:styleLbl>
+  <dgm:styleLbl name="node1">
+    <dgm:scene3d>
+      <a:camera prst="orthographicFront"/>
+      <a:lightRig rig="threePt" dir="t"/>
+    </dgm:scene3d>
+    <dgm:sp3d/>
+    <dgm:txPr/>
+    <dgm:style>
+      <a:lnRef idx="2">
+        <a:scrgbClr r="0" g="0" b="0"/>
+      </a:lnRef>
+      <a:fillRef idx="1">
+        <a:scrgbClr r="0" g="0" b="0"/>
+      </a:fillRef>
+      <a:effectRef idx="0">
+        <a:scrgbClr r="0" g="0" b="0"/>
+      </a:effectRef>
+      <a:fontRef idx="minor">
+        <a:schemeClr val="lt1"/>
+      </a:fontRef>
+    </dgm:style>
+  </dgm:styleLbl>
+  <dgm:styleLbl name="node2">
+    <dgm:scene3d>
+      <a:camera prst="orthographicFront"/>
+      <a:lightRig rig="threePt" dir="t"/>
+    </dgm:scene3d>
+    <dgm:sp3d/>
+    <dgm:txPr/>
+    <dgm:style>
+      <a:lnRef idx="2">
+        <a:scrgbClr r="0" g="0" b="0"/>
+      </a:lnRef>
+      <a:fillRef idx="1">
+        <a:scrgbClr r="0" g="0" b="0"/>
+      </a:fillRef>
+      <a:effectRef idx="0">
+        <a:scrgbClr r="0" g="0" b="0"/>
+      </a:effectRef>
+      <a:fontRef idx="minor">
+        <a:schemeClr val="lt1"/>
+      </a:fontRef>
+    </dgm:style>
+  </dgm:styleLbl>
+  <dgm:styleLbl name="node3">
+    <dgm:scene3d>
+      <a:camera prst="orthographicFront"/>
+      <a:lightRig rig="threePt" dir="t"/>
+    </dgm:scene3d>
+    <dgm:sp3d/>
+    <dgm:txPr/>
+    <dgm:style>
+      <a:lnRef idx="2">
+        <a:scrgbClr r="0" g="0" b="0"/>
+      </a:lnRef>
+      <a:fillRef idx="1">
+        <a:scrgbClr r="0" g="0" b="0"/>
+      </a:fillRef>
+      <a:effectRef idx="0">
+        <a:scrgbClr r="0" g="0" b="0"/>
+      </a:effectRef>
+      <a:fontRef idx="minor">
+        <a:schemeClr val="lt1"/>
+      </a:fontRef>
+    </dgm:style>
+  </dgm:styleLbl>
+  <dgm:styleLbl name="node4">
+    <dgm:scene3d>
+      <a:camera prst="orthographicFront"/>
+      <a:lightRig rig="threePt" dir="t"/>
+    </dgm:scene3d>
+    <dgm:sp3d/>
+    <dgm:txPr/>
+    <dgm:style>
+      <a:lnRef idx="2">
+        <a:scrgbClr r="0" g="0" b="0"/>
+      </a:lnRef>
+      <a:fillRef idx="1">
+        <a:scrgbClr r="0" g="0" b="0"/>
+      </a:fillRef>
+      <a:effectRef idx="0">
+        <a:scrgbClr r="0" g="0" b="0"/>
+      </a:effectRef>
+      <a:fontRef idx="minor">
+        <a:schemeClr val="lt1"/>
+      </a:fontRef>
+    </dgm:style>
+  </dgm:styleLbl>
+  <dgm:styleLbl name="fgImgPlace1">
+    <dgm:scene3d>
+      <a:camera prst="orthographicFront"/>
+      <a:lightRig rig="threePt" dir="t"/>
+    </dgm:scene3d>
+    <dgm:sp3d/>
+    <dgm:txPr/>
+    <dgm:style>
+      <a:lnRef idx="2">
+        <a:scrgbClr r="0" g="0" b="0"/>
+      </a:lnRef>
+      <a:fillRef idx="1">
+        <a:scrgbClr r="0" g="0" b="0"/>
+      </a:fillRef>
+      <a:effectRef idx="0">
+        <a:scrgbClr r="0" g="0" b="0"/>
+      </a:effectRef>
+      <a:fontRef idx="minor"/>
+    </dgm:style>
+  </dgm:styleLbl>
+  <dgm:styleLbl name="alignImgPlace1">
+    <dgm:scene3d>
+      <a:camera prst="orthographicFront"/>
+      <a:lightRig rig="threePt" dir="t"/>
+    </dgm:scene3d>
+    <dgm:sp3d/>
+    <dgm:txPr/>
+    <dgm:style>
+      <a:lnRef idx="2">
+        <a:scrgbClr r="0" g="0" b="0"/>
+      </a:lnRef>
+      <a:fillRef idx="1">
+        <a:scrgbClr r="0" g="0" b="0"/>
+      </a:fillRef>
+      <a:effectRef idx="0">
+        <a:scrgbClr r="0" g="0" b="0"/>
+      </a:effectRef>
+      <a:fontRef idx="minor"/>
+    </dgm:style>
+  </dgm:styleLbl>
+  <dgm:styleLbl name="bgImgPlace1">
+    <dgm:scene3d>
+      <a:camera prst="orthographicFront"/>
+      <a:lightRig rig="threePt" dir="t"/>
+    </dgm:scene3d>
+    <dgm:sp3d/>
+    <dgm:txPr/>
+    <dgm:style>
+      <a:lnRef idx="2">
+        <a:scrgbClr r="0" g="0" b="0"/>
+      </a:lnRef>
+      <a:fillRef idx="1">
+        <a:scrgbClr r="0" g="0" b="0"/>
+      </a:fillRef>
+      <a:effectRef idx="0">
+        <a:scrgbClr r="0" g="0" b="0"/>
+      </a:effectRef>
+      <a:fontRef idx="minor"/>
+    </dgm:style>
+  </dgm:styleLbl>
+  <dgm:styleLbl name="sibTrans2D1">
+    <dgm:scene3d>
+      <a:camera prst="orthographicFront"/>
+      <a:lightRig rig="threePt" dir="t"/>
+    </dgm:scene3d>
+    <dgm:sp3d/>
+    <dgm:txPr/>
+    <dgm:style>
+      <a:lnRef idx="0">
+        <a:scrgbClr r="0" g="0" b="0"/>
+      </a:lnRef>
+      <a:fillRef idx="1">
+        <a:scrgbClr r="0" g="0" b="0"/>
+      </a:fillRef>
+      <a:effectRef idx="0">
+        <a:scrgbClr r="0" g="0" b="0"/>
+      </a:effectRef>
+      <a:fontRef idx="minor">
+        <a:schemeClr val="lt1"/>
+      </a:fontRef>
+    </dgm:style>
+  </dgm:styleLbl>
+  <dgm:styleLbl name="fgSibTrans2D1">
+    <dgm:scene3d>
+      <a:camera prst="orthographicFront"/>
+      <a:lightRig rig="threePt" dir="t"/>
+    </dgm:scene3d>
+    <dgm:sp3d/>
+    <dgm:txPr/>
+    <dgm:style>
+      <a:lnRef idx="0">
+        <a:scrgbClr r="0" g="0" b="0"/>
+      </a:lnRef>
+      <a:fillRef idx="1">
+        <a:scrgbClr r="0" g="0" b="0"/>
+      </a:fillRef>
+      <a:effectRef idx="0">
+        <a:scrgbClr r="0" g="0" b="0"/>
+      </a:effectRef>
+      <a:fontRef idx="minor">
+        <a:schemeClr val="lt1"/>
+      </a:fontRef>
+    </dgm:style>
+  </dgm:styleLbl>
+  <dgm:styleLbl name="bgSibTrans2D1">
+    <dgm:scene3d>
+      <a:camera prst="orthographicFront"/>
+      <a:lightRig rig="threePt" dir="t"/>
+    </dgm:scene3d>
+    <dgm:sp3d/>
+    <dgm:txPr/>
+    <dgm:style>
+      <a:lnRef idx="0">
+        <a:scrgbClr r="0" g="0" b="0"/>
+      </a:lnRef>
+      <a:fillRef idx="1">
+        <a:scrgbClr r="0" g="0" b="0"/>
+      </a:fillRef>
+      <a:effectRef idx="0">
+        <a:scrgbClr r="0" g="0" b="0"/>
+      </a:effectRef>
+      <a:fontRef idx="minor">
+        <a:schemeClr val="lt1"/>
+      </a:fontRef>
+    </dgm:style>
+  </dgm:styleLbl>
+  <dgm:styleLbl name="sibTrans1D1">
+    <dgm:scene3d>
+      <a:camera prst="orthographicFront"/>
+      <a:lightRig rig="threePt" dir="t"/>
+    </dgm:scene3d>
+    <dgm:sp3d/>
+    <dgm:txPr/>
+    <dgm:style>
+      <a:lnRef idx="1">
+        <a:scrgbClr r="0" g="0" b="0"/>
+      </a:lnRef>
+      <a:fillRef idx="0">
+        <a:scrgbClr r="0" g="0" b="0"/>
+      </a:fillRef>
+      <a:effectRef idx="0">
+        <a:scrgbClr r="0" g="0" b="0"/>
+      </a:effectRef>
+      <a:fontRef idx="minor"/>
+    </dgm:style>
+  </dgm:styleLbl>
+  <dgm:styleLbl name="callout">
+    <dgm:scene3d>
+      <a:camera prst="orthographicFront"/>
+      <a:lightRig rig="threePt" dir="t"/>
+    </dgm:scene3d>
+    <dgm:sp3d/>
+    <dgm:txPr/>
+    <dgm:style>
+      <a:lnRef idx="2">
+        <a:scrgbClr r="0" g="0" b="0"/>
+      </a:lnRef>
+      <a:fillRef idx="1">
+        <a:scrgbClr r="0" g="0" b="0"/>
+      </a:fillRef>
+      <a:effectRef idx="0">
+        <a:scrgbClr r="0" g="0" b="0"/>
+      </a:effectRef>
+      <a:fontRef idx="minor"/>
+    </dgm:style>
+  </dgm:styleLbl>
+  <dgm:styleLbl name="asst0">
+    <dgm:scene3d>
+      <a:camera prst="orthographicFront"/>
+      <a:lightRig rig="threePt" dir="t"/>
+    </dgm:scene3d>
+    <dgm:sp3d/>
+    <dgm:txPr/>
+    <dgm:style>
+      <a:lnRef idx="2">
+        <a:scrgbClr r="0" g="0" b="0"/>
+      </a:lnRef>
+      <a:fillRef idx="1">
+        <a:scrgbClr r="0" g="0" b="0"/>
+      </a:fillRef>
+      <a:effectRef idx="0">
+        <a:scrgbClr r="0" g="0" b="0"/>
+      </a:effectRef>
+      <a:fontRef idx="minor">
+        <a:schemeClr val="lt1"/>
+      </a:fontRef>
+    </dgm:style>
+  </dgm:styleLbl>
+  <dgm:styleLbl name="asst1">
+    <dgm:scene3d>
+      <a:camera prst="orthographicFront"/>
+      <a:lightRig rig="threePt" dir="t"/>
+    </dgm:scene3d>
+    <dgm:sp3d/>
+    <dgm:txPr/>
+    <dgm:style>
+      <a:lnRef idx="2">
+        <a:scrgbClr r="0" g="0" b="0"/>
+      </a:lnRef>
+      <a:fillRef idx="1">
+        <a:scrgbClr r="0" g="0" b="0"/>
+      </a:fillRef>
+      <a:effectRef idx="0">
+        <a:scrgbClr r="0" g="0" b="0"/>
+      </a:effectRef>
+      <a:fontRef idx="minor">
+        <a:schemeClr val="lt1"/>
+      </a:fontRef>
+    </dgm:style>
+  </dgm:styleLbl>
+  <dgm:styleLbl name="asst2">
+    <dgm:scene3d>
+      <a:camera prst="orthographicFront"/>
+      <a:lightRig rig="threePt" dir="t"/>
+    </dgm:scene3d>
+    <dgm:sp3d/>
+    <dgm:txPr/>
+    <dgm:style>
+      <a:lnRef idx="2">
+        <a:scrgbClr r="0" g="0" b="0"/>
+      </a:lnRef>
+      <a:fillRef idx="1">
+        <a:scrgbClr r="0" g="0" b="0"/>
+      </a:fillRef>
+      <a:effectRef idx="0">
+        <a:scrgbClr r="0" g="0" b="0"/>
+      </a:effectRef>
+      <a:fontRef idx="minor">
+        <a:schemeClr val="lt1"/>
+      </a:fontRef>
+    </dgm:style>
+  </dgm:styleLbl>
+  <dgm:styleLbl name="asst3">
+    <dgm:scene3d>
+      <a:camera prst="orthographicFront"/>
+      <a:lightRig rig="threePt" dir="t"/>
+    </dgm:scene3d>
+    <dgm:sp3d/>
+    <dgm:txPr/>
+    <dgm:style>
+      <a:lnRef idx="2">
+        <a:scrgbClr r="0" g="0" b="0"/>
+      </a:lnRef>
+      <a:fillRef idx="1">
+        <a:scrgbClr r="0" g="0" b="0"/>
+      </a:fillRef>
+      <a:effectRef idx="0">
+        <a:scrgbClr r="0" g="0" b="0"/>
+      </a:effectRef>
+      <a:fontRef idx="minor">
+        <a:schemeClr val="lt1"/>
+      </a:fontRef>
+    </dgm:style>
+  </dgm:styleLbl>
+  <dgm:styleLbl name="asst4">
+    <dgm:scene3d>
+      <a:camera prst="orthographicFront"/>
+      <a:lightRig rig="threePt" dir="t"/>
+    </dgm:scene3d>
+    <dgm:sp3d/>
+    <dgm:txPr/>
+    <dgm:style>
+      <a:lnRef idx="2">
+        <a:scrgbClr r="0" g="0" b="0"/>
+      </a:lnRef>
+      <a:fillRef idx="1">
+        <a:scrgbClr r="0" g="0" b="0"/>
+      </a:fillRef>
+      <a:effectRef idx="0">
+        <a:scrgbClr r="0" g="0" b="0"/>
+      </a:effectRef>
+      <a:fontRef idx="minor">
+        <a:schemeClr val="lt1"/>
+      </a:fontRef>
+    </dgm:style>
+  </dgm:styleLbl>
+  <dgm:styleLbl name="parChTrans2D1">
+    <dgm:scene3d>
+      <a:camera prst="orthographicFront"/>
+      <a:lightRig rig="threePt" dir="t"/>
+    </dgm:scene3d>
+    <dgm:sp3d/>
+    <dgm:txPr/>
+    <dgm:style>
+      <a:lnRef idx="2">
+        <a:scrgbClr r="0" g="0" b="0"/>
+      </a:lnRef>
+      <a:fillRef idx="1">
+        <a:scrgbClr r="0" g="0" b="0"/>
+      </a:fillRef>
+      <a:effectRef idx="0">
+        <a:scrgbClr r="0" g="0" b="0"/>
+      </a:effectRef>
+      <a:fontRef idx="minor">
+        <a:schemeClr val="lt1"/>
+      </a:fontRef>
+    </dgm:style>
+  </dgm:styleLbl>
+  <dgm:styleLbl name="parChTrans2D2">
+    <dgm:scene3d>
+      <a:camera prst="orthographicFront"/>
+      <a:lightRig rig="threePt" dir="t"/>
+    </dgm:scene3d>
+    <dgm:sp3d/>
+    <dgm:txPr/>
+    <dgm:style>
+      <a:lnRef idx="2">
+        <a:scrgbClr r="0" g="0" b="0"/>
+      </a:lnRef>
+      <a:fillRef idx="1">
+        <a:scrgbClr r="0" g="0" b="0"/>
+      </a:fillRef>
+      <a:effectRef idx="0">
+        <a:scrgbClr r="0" g="0" b="0"/>
+      </a:effectRef>
+      <a:fontRef idx="minor">
+        <a:schemeClr val="lt1"/>
+      </a:fontRef>
+    </dgm:style>
+  </dgm:styleLbl>
+  <dgm:styleLbl name="parChTrans2D3">
+    <dgm:scene3d>
+      <a:camera prst="orthographicFront"/>
+      <a:lightRig rig="threePt" dir="t"/>
+    </dgm:scene3d>
+    <dgm:sp3d/>
+    <dgm:txPr/>
+    <dgm:style>
+      <a:lnRef idx="2">
+        <a:scrgbClr r="0" g="0" b="0"/>
+      </a:lnRef>
+      <a:fillRef idx="1">
+        <a:scrgbClr r="0" g="0" b="0"/>
+      </a:fillRef>
+      <a:effectRef idx="0">
+        <a:scrgbClr r="0" g="0" b="0"/>
+      </a:effectRef>
+      <a:fontRef idx="minor">
+        <a:schemeClr val="lt1"/>
+      </a:fontRef>
+    </dgm:style>
+  </dgm:styleLbl>
+  <dgm:styleLbl name="parChTrans2D4">
+    <dgm:scene3d>
+      <a:camera prst="orthographicFront"/>
+      <a:lightRig rig="threePt" dir="t"/>
+    </dgm:scene3d>
+    <dgm:sp3d/>
+    <dgm:txPr/>
+    <dgm:style>
+      <a:lnRef idx="2">
+        <a:scrgbClr r="0" g="0" b="0"/>
+      </a:lnRef>
+      <a:fillRef idx="1">
+        <a:scrgbClr r="0" g="0" b="0"/>
+      </a:fillRef>
+      <a:effectRef idx="0">
+        <a:scrgbClr r="0" g="0" b="0"/>
+      </a:effectRef>
+      <a:fontRef idx="minor">
+        <a:schemeClr val="lt1"/>
+      </a:fontRef>
+    </dgm:style>
+  </dgm:styleLbl>
+  <dgm:styleLbl name="parChTrans1D1">
+    <dgm:scene3d>
+      <a:camera prst="orthographicFront"/>
+      <a:lightRig rig="threePt" dir="t"/>
+    </dgm:scene3d>
+    <dgm:sp3d/>
+    <dgm:txPr/>
+    <dgm:style>
+      <a:lnRef idx="2">
+        <a:scrgbClr r="0" g="0" b="0"/>
+      </a:lnRef>
+      <a:fillRef idx="0">
+        <a:scrgbClr r="0" g="0" b="0"/>
+      </a:fillRef>
+      <a:effectRef idx="0">
+        <a:scrgbClr r="0" g="0" b="0"/>
+      </a:effectRef>
+      <a:fontRef idx="minor"/>
+    </dgm:style>
+  </dgm:styleLbl>
+  <dgm:styleLbl name="parChTrans1D2">
+    <dgm:scene3d>
+      <a:camera prst="orthographicFront"/>
+      <a:lightRig rig="threePt" dir="t"/>
+    </dgm:scene3d>
+    <dgm:sp3d/>
+    <dgm:txPr/>
+    <dgm:style>
+      <a:lnRef idx="2">
+        <a:scrgbClr r="0" g="0" b="0"/>
+      </a:lnRef>
+      <a:fillRef idx="0">
+        <a:scrgbClr r="0" g="0" b="0"/>
+      </a:fillRef>
+      <a:effectRef idx="0">
+        <a:scrgbClr r="0" g="0" b="0"/>
+      </a:effectRef>
+      <a:fontRef idx="minor"/>
+    </dgm:style>
+  </dgm:styleLbl>
+  <dgm:styleLbl name="parChTrans1D3">
+    <dgm:scene3d>
+      <a:camera prst="orthographicFront"/>
+      <a:lightRig rig="threePt" dir="t"/>
+    </dgm:scene3d>
+    <dgm:sp3d/>
+    <dgm:txPr/>
+    <dgm:style>
+      <a:lnRef idx="2">
+        <a:scrgbClr r="0" g="0" b="0"/>
+      </a:lnRef>
+      <a:fillRef idx="0">
+        <a:scrgbClr r="0" g="0" b="0"/>
+      </a:fillRef>
+      <a:effectRef idx="0">
+        <a:scrgbClr r="0" g="0" b="0"/>
+      </a:effectRef>
+      <a:fontRef idx="minor"/>
+    </dgm:style>
+  </dgm:styleLbl>
+  <dgm:styleLbl name="parChTrans1D4">
+    <dgm:scene3d>
+      <a:camera prst="orthographicFront"/>
+      <a:lightRig rig="threePt" dir="t"/>
+    </dgm:scene3d>
+    <dgm:sp3d/>
+    <dgm:txPr/>
+    <dgm:style>
+      <a:lnRef idx="2">
+        <a:scrgbClr r="0" g="0" b="0"/>
+      </a:lnRef>
+      <a:fillRef idx="0">
+        <a:scrgbClr r="0" g="0" b="0"/>
+      </a:fillRef>
+      <a:effectRef idx="0">
+        <a:scrgbClr r="0" g="0" b="0"/>
+      </a:effectRef>
+      <a:fontRef idx="minor"/>
+    </dgm:style>
+  </dgm:styleLbl>
+  <dgm:styleLbl name="fgAcc1">
+    <dgm:scene3d>
+      <a:camera prst="orthographicFront"/>
+      <a:lightRig rig="threePt" dir="t"/>
+    </dgm:scene3d>
+    <dgm:sp3d/>
+    <dgm:txPr/>
+    <dgm:style>
+      <a:lnRef idx="2">
+        <a:scrgbClr r="0" g="0" b="0"/>
+      </a:lnRef>
+      <a:fillRef idx="1">
+        <a:scrgbClr r="0" g="0" b="0"/>
+      </a:fillRef>
+      <a:effectRef idx="0">
+        <a:scrgbClr r="0" g="0" b="0"/>
+      </a:effectRef>
+      <a:fontRef idx="minor"/>
+    </dgm:style>
+  </dgm:styleLbl>
+  <dgm:styleLbl name="conFgAcc1">
+    <dgm:scene3d>
+      <a:camera prst="orthographicFront"/>
+      <a:lightRig rig="threePt" dir="t"/>
+    </dgm:scene3d>
+    <dgm:sp3d/>
+    <dgm:txPr/>
+    <dgm:style>
+      <a:lnRef idx="2">
+        <a:scrgbClr r="0" g="0" b="0"/>
+      </a:lnRef>
+      <a:fillRef idx="1">
+        <a:scrgbClr r="0" g="0" b="0"/>
+      </a:fillRef>
+      <a:effectRef idx="0">
+        <a:scrgbClr r="0" g="0" b="0"/>
+      </a:effectRef>
+      <a:fontRef idx="minor"/>
+    </dgm:style>
+  </dgm:styleLbl>
+  <dgm:styleLbl name="alignAcc1">
+    <dgm:scene3d>
+      <a:camera prst="orthographicFront"/>
+      <a:lightRig rig="threePt" dir="t"/>
+    </dgm:scene3d>
+    <dgm:sp3d/>
+    <dgm:txPr/>
+    <dgm:style>
+      <a:lnRef idx="2">
+        <a:scrgbClr r="0" g="0" b="0"/>
+      </a:lnRef>
+      <a:fillRef idx="1">
+        <a:scrgbClr r="0" g="0" b="0"/>
+      </a:fillRef>
+      <a:effectRef idx="0">
+        <a:scrgbClr r="0" g="0" b="0"/>
+      </a:effectRef>
+      <a:fontRef idx="minor"/>
+    </dgm:style>
+  </dgm:styleLbl>
+  <dgm:styleLbl name="trAlignAcc1">
+    <dgm:scene3d>
+      <a:camera prst="orthographicFront"/>
+      <a:lightRig rig="threePt" dir="t"/>
+    </dgm:scene3d>
+    <dgm:sp3d/>
+    <dgm:txPr/>
+    <dgm:style>
+      <a:lnRef idx="1">
+        <a:scrgbClr r="0" g="0" b="0"/>
+      </a:lnRef>
+      <a:fillRef idx="1">
+        <a:scrgbClr r="0" g="0" b="0"/>
+      </a:fillRef>
+      <a:effectRef idx="0">
+        <a:scrgbClr r="0" g="0" b="0"/>
+      </a:effectRef>
+      <a:fontRef idx="minor"/>
+    </dgm:style>
+  </dgm:styleLbl>
+  <dgm:styleLbl name="bgAcc1">
+    <dgm:scene3d>
+      <a:camera prst="orthographicFront"/>
+      <a:lightRig rig="threePt" dir="t"/>
+    </dgm:scene3d>
+    <dgm:sp3d/>
+    <dgm:txPr/>
+    <dgm:style>
+      <a:lnRef idx="2">
+        <a:scrgbClr r="0" g="0" b="0"/>
+      </a:lnRef>
+      <a:fillRef idx="1">
+        <a:scrgbClr r="0" g="0" b="0"/>
+      </a:fillRef>
+      <a:effectRef idx="0">
+        <a:scrgbClr r="0" g="0" b="0"/>
+      </a:effectRef>
+      <a:fontRef idx="minor"/>
+    </dgm:style>
+  </dgm:styleLbl>
+  <dgm:styleLbl name="solidFgAcc1">
+    <dgm:scene3d>
+      <a:camera prst="orthographicFront"/>
+      <a:lightRig rig="threePt" dir="t"/>
+    </dgm:scene3d>
+    <dgm:sp3d/>
+    <dgm:txPr/>
+    <dgm:style>
+      <a:lnRef idx="2">
+        <a:scrgbClr r="0" g="0" b="0"/>
+      </a:lnRef>
+      <a:fillRef idx="1">
+        <a:scrgbClr r="0" g="0" b="0"/>
+      </a:fillRef>
+      <a:effectRef idx="0">
+        <a:scrgbClr r="0" g="0" b="0"/>
+      </a:effectRef>
+      <a:fontRef idx="minor"/>
+    </dgm:style>
+  </dgm:styleLbl>
+  <dgm:styleLbl name="solidAlignAcc1">
+    <dgm:scene3d>
+      <a:camera prst="orthographicFront"/>
+      <a:lightRig rig="threePt" dir="t"/>
+    </dgm:scene3d>
+    <dgm:sp3d/>
+    <dgm:txPr/>
+    <dgm:style>
+      <a:lnRef idx="2">
+        <a:scrgbClr r="0" g="0" b="0"/>
+      </a:lnRef>
+      <a:fillRef idx="1">
+        <a:scrgbClr r="0" g="0" b="0"/>
+      </a:fillRef>
+      <a:effectRef idx="0">
+        <a:scrgbClr r="0" g="0" b="0"/>
+      </a:effectRef>
+      <a:fontRef idx="minor"/>
+    </dgm:style>
+  </dgm:styleLbl>
+  <dgm:styleLbl name="solidBgAcc1">
+    <dgm:scene3d>
+      <a:camera prst="orthographicFront"/>
+      <a:lightRig rig="threePt" dir="t"/>
+    </dgm:scene3d>
+    <dgm:sp3d/>
+    <dgm:txPr/>
+    <dgm:style>
+      <a:lnRef idx="2">
+        <a:scrgbClr r="0" g="0" b="0"/>
+      </a:lnRef>
+      <a:fillRef idx="1">
+        <a:scrgbClr r="0" g="0" b="0"/>
+      </a:fillRef>
+      <a:effectRef idx="0">
+        <a:scrgbClr r="0" g="0" b="0"/>
+      </a:effectRef>
+      <a:fontRef idx="minor"/>
+    </dgm:style>
+  </dgm:styleLbl>
+  <dgm:styleLbl name="fgAccFollowNode1">
+    <dgm:scene3d>
+      <a:camera prst="orthographicFront"/>
+      <a:lightRig rig="threePt" dir="t"/>
+    </dgm:scene3d>
+    <dgm:sp3d/>
+    <dgm:txPr/>
+    <dgm:style>
+      <a:lnRef idx="2">
+        <a:scrgbClr r="0" g="0" b="0"/>
+      </a:lnRef>
+      <a:fillRef idx="1">
+        <a:scrgbClr r="0" g="0" b="0"/>
+      </a:fillRef>
+      <a:effectRef idx="0">
+        <a:scrgbClr r="0" g="0" b="0"/>
+      </a:effectRef>
+      <a:fontRef idx="minor"/>
+    </dgm:style>
+  </dgm:styleLbl>
+  <dgm:styleLbl name="alignAccFollowNode1">
+    <dgm:scene3d>
+      <a:camera prst="orthographicFront"/>
+      <a:lightRig rig="threePt" dir="t"/>
+    </dgm:scene3d>
+    <dgm:sp3d/>
+    <dgm:txPr/>
+    <dgm:style>
+      <a:lnRef idx="2">
+        <a:scrgbClr r="0" g="0" b="0"/>
+      </a:lnRef>
+      <a:fillRef idx="1">
+        <a:scrgbClr r="0" g="0" b="0"/>
+      </a:fillRef>
+      <a:effectRef idx="0">
+        <a:scrgbClr r="0" g="0" b="0"/>
+      </a:effectRef>
+      <a:fontRef idx="minor"/>
+    </dgm:style>
+  </dgm:styleLbl>
+  <dgm:styleLbl name="bgAccFollowNode1">
+    <dgm:scene3d>
+      <a:camera prst="orthographicFront"/>
+      <a:lightRig rig="threePt" dir="t"/>
+    </dgm:scene3d>
+    <dgm:sp3d/>
+    <dgm:txPr/>
+    <dgm:style>
+      <a:lnRef idx="2">
+        <a:scrgbClr r="0" g="0" b="0"/>
+      </a:lnRef>
+      <a:fillRef idx="1">
+        <a:scrgbClr r="0" g="0" b="0"/>
+      </a:fillRef>
+      <a:effectRef idx="0">
+        <a:scrgbClr r="0" g="0" b="0"/>
+      </a:effectRef>
+      <a:fontRef idx="minor"/>
+    </dgm:style>
+  </dgm:styleLbl>
+  <dgm:styleLbl name="fgAcc0">
+    <dgm:scene3d>
+      <a:camera prst="orthographicFront"/>
+      <a:lightRig rig="threePt" dir="t"/>
+    </dgm:scene3d>
+    <dgm:sp3d/>
+    <dgm:txPr/>
+    <dgm:style>
+      <a:lnRef idx="2">
+        <a:scrgbClr r="0" g="0" b="0"/>
+      </a:lnRef>
+      <a:fillRef idx="1">
+        <a:scrgbClr r="0" g="0" b="0"/>
+      </a:fillRef>
+      <a:effectRef idx="0">
+        <a:scrgbClr r="0" g="0" b="0"/>
+      </a:effectRef>
+      <a:fontRef idx="minor"/>
+    </dgm:style>
+  </dgm:styleLbl>
+  <dgm:styleLbl name="fgAcc2">
+    <dgm:scene3d>
+      <a:camera prst="orthographicFront"/>
+      <a:lightRig rig="threePt" dir="t"/>
+    </dgm:scene3d>
+    <dgm:sp3d/>
+    <dgm:txPr/>
+    <dgm:style>
+      <a:lnRef idx="2">
+        <a:scrgbClr r="0" g="0" b="0"/>
+      </a:lnRef>
+      <a:fillRef idx="1">
+        <a:scrgbClr r="0" g="0" b="0"/>
+      </a:fillRef>
+      <a:effectRef idx="0">
+        <a:scrgbClr r="0" g="0" b="0"/>
+      </a:effectRef>
+      <a:fontRef idx="minor"/>
+    </dgm:style>
+  </dgm:styleLbl>
+  <dgm:styleLbl name="fgAcc3">
+    <dgm:scene3d>
+      <a:camera prst="orthographicFront"/>
+      <a:lightRig rig="threePt" dir="t"/>
+    </dgm:scene3d>
+    <dgm:sp3d/>
+    <dgm:txPr/>
+    <dgm:style>
+      <a:lnRef idx="2">
+        <a:scrgbClr r="0" g="0" b="0"/>
+      </a:lnRef>
+      <a:fillRef idx="1">
+        <a:scrgbClr r="0" g="0" b="0"/>
+      </a:fillRef>
+      <a:effectRef idx="0">
+        <a:scrgbClr r="0" g="0" b="0"/>
+      </a:effectRef>
+      <a:fontRef idx="minor"/>
+    </dgm:style>
+  </dgm:styleLbl>
+  <dgm:styleLbl name="fgAcc4">
+    <dgm:scene3d>
+      <a:camera prst="orthographicFront"/>
+      <a:lightRig rig="threePt" dir="t"/>
+    </dgm:scene3d>
+    <dgm:sp3d/>
+    <dgm:txPr/>
+    <dgm:style>
+      <a:lnRef idx="2">
+        <a:scrgbClr r="0" g="0" b="0"/>
+      </a:lnRef>
+      <a:fillRef idx="1">
+        <a:scrgbClr r="0" g="0" b="0"/>
+      </a:fillRef>
+      <a:effectRef idx="0">
+        <a:scrgbClr r="0" g="0" b="0"/>
+      </a:effectRef>
+      <a:fontRef idx="minor"/>
+    </dgm:style>
+  </dgm:styleLbl>
+  <dgm:styleLbl name="bgShp">
+    <dgm:scene3d>
+      <a:camera prst="orthographicFront"/>
+      <a:lightRig rig="threePt" dir="t"/>
+    </dgm:scene3d>
+    <dgm:sp3d/>
+    <dgm:txPr/>
+    <dgm:style>
+      <a:lnRef idx="0">
+        <a:scrgbClr r="0" g="0" b="0"/>
+      </a:lnRef>
+      <a:fillRef idx="1">
+        <a:scrgbClr r="0" g="0" b="0"/>
+      </a:fillRef>
+      <a:effectRef idx="0">
+        <a:scrgbClr r="0" g="0" b="0"/>
+      </a:effectRef>
+      <a:fontRef idx="minor"/>
+    </dgm:style>
+  </dgm:styleLbl>
+  <dgm:styleLbl name="dkBgShp">
+    <dgm:scene3d>
+      <a:camera prst="orthographicFront"/>
+      <a:lightRig rig="threePt" dir="t"/>
+    </dgm:scene3d>
+    <dgm:sp3d/>
+    <dgm:txPr/>
+    <dgm:style>
+      <a:lnRef idx="0">
+        <a:scrgbClr r="0" g="0" b="0"/>
+      </a:lnRef>
+      <a:fillRef idx="1">
+        <a:scrgbClr r="0" g="0" b="0"/>
+      </a:fillRef>
+      <a:effectRef idx="0">
+        <a:scrgbClr r="0" g="0" b="0"/>
+      </a:effectRef>
+      <a:fontRef idx="minor"/>
+    </dgm:style>
+  </dgm:styleLbl>
+  <dgm:styleLbl name="trBgShp">
+    <dgm:scene3d>
+      <a:camera prst="orthographicFront"/>
+      <a:lightRig rig="threePt" dir="t"/>
+    </dgm:scene3d>
+    <dgm:sp3d/>
+    <dgm:txPr/>
+    <dgm:style>
+      <a:lnRef idx="0">
+        <a:scrgbClr r="0" g="0" b="0"/>
+      </a:lnRef>
+      <a:fillRef idx="1">
+        <a:scrgbClr r="0" g="0" b="0"/>
+      </a:fillRef>
+      <a:effectRef idx="0">
+        <a:scrgbClr r="0" g="0" b="0"/>
+      </a:effectRef>
+      <a:fontRef idx="minor"/>
+    </dgm:style>
+  </dgm:styleLbl>
+  <dgm:styleLbl name="fgShp">
+    <dgm:scene3d>
+      <a:camera prst="orthographicFront"/>
+      <a:lightRig rig="threePt" dir="t"/>
+    </dgm:scene3d>
+    <dgm:sp3d/>
+    <dgm:txPr/>
+    <dgm:style>
+      <a:lnRef idx="2">
+        <a:scrgbClr r="0" g="0" b="0"/>
+      </a:lnRef>
+      <a:fillRef idx="1">
+        <a:scrgbClr r="0" g="0" b="0"/>
+      </a:fillRef>
+      <a:effectRef idx="0">
+        <a:scrgbClr r="0" g="0" b="0"/>
+      </a:effectRef>
+      <a:fontRef idx="minor"/>
+    </dgm:style>
+  </dgm:styleLbl>
+  <dgm:styleLbl name="revTx">
+    <dgm:scene3d>
+      <a:camera prst="orthographicFront"/>
+      <a:lightRig rig="threePt" dir="t"/>
+    </dgm:scene3d>
+    <dgm:sp3d/>
+    <dgm:txPr/>
+    <dgm:style>
+      <a:lnRef idx="0">
+        <a:scrgbClr r="0" g="0" b="0"/>
+      </a:lnRef>
+      <a:fillRef idx="0">
+        <a:scrgbClr r="0" g="0" b="0"/>
+      </a:fillRef>
+      <a:effectRef idx="0">
+        <a:scrgbClr r="0" g="0" b="0"/>
+      </a:effectRef>
+      <a:fontRef idx="minor"/>
+    </dgm:style>
+  </dgm:styleLbl>
+</dgm:styleDef>
 </file>
 
 <file path=ppt/slideLayouts/slideLayout1.xml><?xml version="1.0" encoding="utf-8"?>
@@ -281,7 +2903,7 @@
             <a:fld id="{87DE6118-2437-4B30-8E3C-4D2BE6020583}" type="datetimeFigureOut">
               <a:rPr lang="en-US" dirty="0"/>
               <a:pPr/>
-              <a:t>10/31/2021</a:t>
+              <a:t>11/1/2021</a:t>
             </a:fld>
             <a:endParaRPr lang="en-US" dirty="0"/>
           </a:p>
@@ -607,7 +3229,7 @@
           <a:p>
             <a:fld id="{87DE6118-2437-4B30-8E3C-4D2BE6020583}" type="datetimeFigureOut">
               <a:rPr lang="en-US" dirty="0"/>
-              <a:t>10/31/2021</a:t>
+              <a:t>11/1/2021</a:t>
             </a:fld>
             <a:endParaRPr lang="en-US" dirty="0"/>
           </a:p>
@@ -782,7 +3404,7 @@
           <a:p>
             <a:fld id="{87DE6118-2437-4B30-8E3C-4D2BE6020583}" type="datetimeFigureOut">
               <a:rPr lang="en-US" dirty="0"/>
-              <a:t>10/31/2021</a:t>
+              <a:t>11/1/2021</a:t>
             </a:fld>
             <a:endParaRPr lang="en-US" dirty="0"/>
           </a:p>
@@ -947,7 +3569,7 @@
           <a:p>
             <a:fld id="{87DE6118-2437-4B30-8E3C-4D2BE6020583}" type="datetimeFigureOut">
               <a:rPr lang="en-US" dirty="0"/>
-              <a:t>10/31/2021</a:t>
+              <a:t>11/1/2021</a:t>
             </a:fld>
             <a:endParaRPr lang="en-US" dirty="0"/>
           </a:p>
@@ -1220,7 +3842,7 @@
             <a:fld id="{87DE6118-2437-4B30-8E3C-4D2BE6020583}" type="datetimeFigureOut">
               <a:rPr lang="en-US" dirty="0"/>
               <a:pPr/>
-              <a:t>10/31/2021</a:t>
+              <a:t>11/1/2021</a:t>
             </a:fld>
             <a:endParaRPr lang="en-US" dirty="0"/>
           </a:p>
@@ -1610,7 +4232,7 @@
           <a:p>
             <a:fld id="{87DE6118-2437-4B30-8E3C-4D2BE6020583}" type="datetimeFigureOut">
               <a:rPr lang="en-US" dirty="0"/>
-              <a:t>10/31/2021</a:t>
+              <a:t>11/1/2021</a:t>
             </a:fld>
             <a:endParaRPr lang="en-US" dirty="0"/>
           </a:p>
@@ -2082,7 +4704,7 @@
           <a:p>
             <a:fld id="{87DE6118-2437-4B30-8E3C-4D2BE6020583}" type="datetimeFigureOut">
               <a:rPr lang="en-US" dirty="0"/>
-              <a:t>10/31/2021</a:t>
+              <a:t>11/1/2021</a:t>
             </a:fld>
             <a:endParaRPr lang="en-US" dirty="0"/>
           </a:p>
@@ -2195,7 +4817,7 @@
           <a:p>
             <a:fld id="{87DE6118-2437-4B30-8E3C-4D2BE6020583}" type="datetimeFigureOut">
               <a:rPr lang="en-US" dirty="0"/>
-              <a:t>10/31/2021</a:t>
+              <a:t>11/1/2021</a:t>
             </a:fld>
             <a:endParaRPr lang="en-US" dirty="0"/>
           </a:p>
@@ -2285,7 +4907,7 @@
           <a:p>
             <a:fld id="{87DE6118-2437-4B30-8E3C-4D2BE6020583}" type="datetimeFigureOut">
               <a:rPr lang="en-US" dirty="0"/>
-              <a:t>10/31/2021</a:t>
+              <a:t>11/1/2021</a:t>
             </a:fld>
             <a:endParaRPr lang="en-US" dirty="0"/>
           </a:p>
@@ -2627,7 +5249,7 @@
             <a:fld id="{87DE6118-2437-4B30-8E3C-4D2BE6020583}" type="datetimeFigureOut">
               <a:rPr lang="en-US" dirty="0"/>
               <a:pPr/>
-              <a:t>10/31/2021</a:t>
+              <a:t>11/1/2021</a:t>
             </a:fld>
             <a:endParaRPr lang="en-US" dirty="0"/>
           </a:p>
@@ -3012,7 +5634,7 @@
             <a:fld id="{87DE6118-2437-4B30-8E3C-4D2BE6020583}" type="datetimeFigureOut">
               <a:rPr lang="en-US" dirty="0"/>
               <a:pPr/>
-              <a:t>10/31/2021</a:t>
+              <a:t>11/1/2021</a:t>
             </a:fld>
             <a:endParaRPr lang="en-US" dirty="0"/>
           </a:p>
@@ -3287,7 +5909,7 @@
             <a:fld id="{87DE6118-2437-4B30-8E3C-4D2BE6020583}" type="datetimeFigureOut">
               <a:rPr lang="en-US" dirty="0"/>
               <a:pPr/>
-              <a:t>10/31/2021</a:t>
+              <a:t>11/1/2021</a:t>
             </a:fld>
             <a:endParaRPr lang="en-US" dirty="0"/>
           </a:p>
@@ -3853,6 +6475,34 @@
           </a:p>
         </p:txBody>
       </p:sp>
+      <p:graphicFrame>
+        <p:nvGraphicFramePr>
+          <p:cNvPr id="4" name="Diagram 3">
+            <a:extLst>
+              <a:ext uri="{FF2B5EF4-FFF2-40B4-BE49-F238E27FC236}">
+                <a16:creationId xmlns:a16="http://schemas.microsoft.com/office/drawing/2014/main" id="{D5C59DF0-D9D4-43E6-AD36-5819DB6ADB27}"/>
+              </a:ext>
+            </a:extLst>
+          </p:cNvPr>
+          <p:cNvGraphicFramePr/>
+          <p:nvPr>
+            <p:extLst>
+              <p:ext uri="{D42A27DB-BD31-4B8C-83A1-F6EECF244321}">
+                <p14:modId xmlns:p14="http://schemas.microsoft.com/office/powerpoint/2010/main" val="2761046665"/>
+              </p:ext>
+            </p:extLst>
+          </p:nvPr>
+        </p:nvGraphicFramePr>
+        <p:xfrm>
+          <a:off x="2032000" y="719666"/>
+          <a:ext cx="8128000" cy="5418667"/>
+        </p:xfrm>
+        <a:graphic>
+          <a:graphicData uri="http://schemas.openxmlformats.org/drawingml/2006/diagram">
+            <dgm:relIds xmlns:dgm="http://schemas.openxmlformats.org/drawingml/2006/diagram" xmlns:r="http://schemas.openxmlformats.org/officeDocument/2006/relationships" r:dm="rId2" r:lo="rId3" r:qs="rId4" r:cs="rId5"/>
+          </a:graphicData>
+        </a:graphic>
+      </p:graphicFrame>
     </p:spTree>
     <p:extLst>
       <p:ext uri="{BB962C8B-B14F-4D97-AF65-F5344CB8AC3E}">
@@ -4389,6 +7039,181 @@
     <p:extLst>
       <p:ext uri="{BB962C8B-B14F-4D97-AF65-F5344CB8AC3E}">
         <p14:creationId xmlns:p14="http://schemas.microsoft.com/office/powerpoint/2010/main" val="3512724647"/>
+      </p:ext>
+    </p:extLst>
+  </p:cSld>
+  <p:clrMapOvr>
+    <a:masterClrMapping/>
+  </p:clrMapOvr>
+</p:sld>
+</file>
+
+<file path=ppt/slides/slide6.xml><?xml version="1.0" encoding="utf-8"?>
+<p:sld xmlns:a="http://schemas.openxmlformats.org/drawingml/2006/main" xmlns:r="http://schemas.openxmlformats.org/officeDocument/2006/relationships" xmlns:p="http://schemas.openxmlformats.org/presentationml/2006/main">
+  <p:cSld>
+    <p:spTree>
+      <p:nvGrpSpPr>
+        <p:cNvPr id="1" name=""/>
+        <p:cNvGrpSpPr/>
+        <p:nvPr/>
+      </p:nvGrpSpPr>
+      <p:grpSpPr>
+        <a:xfrm>
+          <a:off x="0" y="0"/>
+          <a:ext cx="0" cy="0"/>
+          <a:chOff x="0" y="0"/>
+          <a:chExt cx="0" cy="0"/>
+        </a:xfrm>
+      </p:grpSpPr>
+      <p:sp>
+        <p:nvSpPr>
+          <p:cNvPr id="2" name="Title 1">
+            <a:extLst>
+              <a:ext uri="{FF2B5EF4-FFF2-40B4-BE49-F238E27FC236}">
+                <a16:creationId xmlns:a16="http://schemas.microsoft.com/office/drawing/2014/main" id="{30F1D3C2-FFCB-4ED1-A08E-B471790C6307}"/>
+              </a:ext>
+            </a:extLst>
+          </p:cNvPr>
+          <p:cNvSpPr>
+            <a:spLocks noGrp="1"/>
+          </p:cNvSpPr>
+          <p:nvPr>
+            <p:ph type="title"/>
+          </p:nvPr>
+        </p:nvSpPr>
+        <p:spPr/>
+        <p:txBody>
+          <a:bodyPr/>
+          <a:lstStyle/>
+          <a:p>
+            <a:r>
+              <a:rPr lang="en-US" dirty="0"/>
+              <a:t>Homepage Component Structure</a:t>
+            </a:r>
+          </a:p>
+        </p:txBody>
+      </p:sp>
+      <p:pic>
+        <p:nvPicPr>
+          <p:cNvPr id="5" name="Content Placeholder 4" descr="Graphical user interface, application, table&#10;&#10;Description automatically generated with medium confidence">
+            <a:extLst>
+              <a:ext uri="{FF2B5EF4-FFF2-40B4-BE49-F238E27FC236}">
+                <a16:creationId xmlns:a16="http://schemas.microsoft.com/office/drawing/2014/main" id="{4D07D835-3F44-470D-B1BA-80CD378457C1}"/>
+              </a:ext>
+            </a:extLst>
+          </p:cNvPr>
+          <p:cNvPicPr>
+            <a:picLocks noGrp="1" noChangeAspect="1"/>
+          </p:cNvPicPr>
+          <p:nvPr>
+            <p:ph idx="1"/>
+          </p:nvPr>
+        </p:nvPicPr>
+        <p:blipFill>
+          <a:blip r:embed="rId2"/>
+          <a:stretch>
+            <a:fillRect/>
+          </a:stretch>
+        </p:blipFill>
+        <p:spPr>
+          <a:xfrm>
+            <a:off x="1490575" y="1638299"/>
+            <a:ext cx="7703759" cy="4670783"/>
+          </a:xfrm>
+        </p:spPr>
+      </p:pic>
+    </p:spTree>
+    <p:extLst>
+      <p:ext uri="{BB962C8B-B14F-4D97-AF65-F5344CB8AC3E}">
+        <p14:creationId xmlns:p14="http://schemas.microsoft.com/office/powerpoint/2010/main" val="1424154150"/>
+      </p:ext>
+    </p:extLst>
+  </p:cSld>
+  <p:clrMapOvr>
+    <a:masterClrMapping/>
+  </p:clrMapOvr>
+</p:sld>
+</file>
+
+<file path=ppt/slides/slide7.xml><?xml version="1.0" encoding="utf-8"?>
+<p:sld xmlns:a="http://schemas.openxmlformats.org/drawingml/2006/main" xmlns:r="http://schemas.openxmlformats.org/officeDocument/2006/relationships" xmlns:p="http://schemas.openxmlformats.org/presentationml/2006/main">
+  <p:cSld>
+    <p:spTree>
+      <p:nvGrpSpPr>
+        <p:cNvPr id="1" name=""/>
+        <p:cNvGrpSpPr/>
+        <p:nvPr/>
+      </p:nvGrpSpPr>
+      <p:grpSpPr>
+        <a:xfrm>
+          <a:off x="0" y="0"/>
+          <a:ext cx="0" cy="0"/>
+          <a:chOff x="0" y="0"/>
+          <a:chExt cx="0" cy="0"/>
+        </a:xfrm>
+      </p:grpSpPr>
+      <p:sp>
+        <p:nvSpPr>
+          <p:cNvPr id="2" name="Title 1">
+            <a:extLst>
+              <a:ext uri="{FF2B5EF4-FFF2-40B4-BE49-F238E27FC236}">
+                <a16:creationId xmlns:a16="http://schemas.microsoft.com/office/drawing/2014/main" id="{1EA831B1-D32C-4583-885C-E01C5B862995}"/>
+              </a:ext>
+            </a:extLst>
+          </p:cNvPr>
+          <p:cNvSpPr>
+            <a:spLocks noGrp="1"/>
+          </p:cNvSpPr>
+          <p:nvPr>
+            <p:ph type="title"/>
+          </p:nvPr>
+        </p:nvSpPr>
+        <p:spPr/>
+        <p:txBody>
+          <a:bodyPr/>
+          <a:lstStyle/>
+          <a:p>
+            <a:r>
+              <a:rPr lang="en-US" dirty="0"/>
+              <a:t>All Countries Component Structure</a:t>
+            </a:r>
+          </a:p>
+        </p:txBody>
+      </p:sp>
+      <p:pic>
+        <p:nvPicPr>
+          <p:cNvPr id="5" name="Picture 4" descr="Graphical user interface, application, table&#10;&#10;Description automatically generated with medium confidence">
+            <a:extLst>
+              <a:ext uri="{FF2B5EF4-FFF2-40B4-BE49-F238E27FC236}">
+                <a16:creationId xmlns:a16="http://schemas.microsoft.com/office/drawing/2014/main" id="{B252E509-0686-4987-98A3-B8268F7CA797}"/>
+              </a:ext>
+            </a:extLst>
+          </p:cNvPr>
+          <p:cNvPicPr>
+            <a:picLocks noChangeAspect="1"/>
+          </p:cNvPicPr>
+          <p:nvPr/>
+        </p:nvPicPr>
+        <p:blipFill>
+          <a:blip r:embed="rId2"/>
+          <a:stretch>
+            <a:fillRect/>
+          </a:stretch>
+        </p:blipFill>
+        <p:spPr>
+          <a:xfrm>
+            <a:off x="1371600" y="1550058"/>
+            <a:ext cx="8194282" cy="4968187"/>
+          </a:xfrm>
+          <a:prstGeom prst="rect">
+            <a:avLst/>
+          </a:prstGeom>
+        </p:spPr>
+      </p:pic>
+    </p:spTree>
+    <p:extLst>
+      <p:ext uri="{BB962C8B-B14F-4D97-AF65-F5344CB8AC3E}">
+        <p14:creationId xmlns:p14="http://schemas.microsoft.com/office/powerpoint/2010/main" val="304565404"/>
       </p:ext>
     </p:extLst>
   </p:cSld>

</xml_diff>

<commit_message>
Add check to CountryRegionCard to switch title when title is 'Americas', should search instead for just 'America'.
</commit_message>
<xml_diff>
--- a/Frontend frameworks.pptx
+++ b/Frontend frameworks.pptx
@@ -6,12 +6,14 @@
   </p:sldMasterIdLst>
   <p:sldIdLst>
     <p:sldId id="256" r:id="rId2"/>
-    <p:sldId id="257" r:id="rId3"/>
-    <p:sldId id="258" r:id="rId4"/>
-    <p:sldId id="259" r:id="rId5"/>
-    <p:sldId id="260" r:id="rId6"/>
-    <p:sldId id="261" r:id="rId7"/>
-    <p:sldId id="262" r:id="rId8"/>
+    <p:sldId id="263" r:id="rId3"/>
+    <p:sldId id="264" r:id="rId4"/>
+    <p:sldId id="257" r:id="rId5"/>
+    <p:sldId id="258" r:id="rId6"/>
+    <p:sldId id="259" r:id="rId7"/>
+    <p:sldId id="260" r:id="rId8"/>
+    <p:sldId id="261" r:id="rId9"/>
+    <p:sldId id="262" r:id="rId10"/>
   </p:sldIdLst>
   <p:sldSz cx="12192000" cy="6858000"/>
   <p:notesSz cx="7315200" cy="9601200"/>
@@ -2903,7 +2905,7 @@
             <a:fld id="{87DE6118-2437-4B30-8E3C-4D2BE6020583}" type="datetimeFigureOut">
               <a:rPr lang="en-US" dirty="0"/>
               <a:pPr/>
-              <a:t>11/1/2021</a:t>
+              <a:t>11/2/2021</a:t>
             </a:fld>
             <a:endParaRPr lang="en-US" dirty="0"/>
           </a:p>
@@ -3229,7 +3231,7 @@
           <a:p>
             <a:fld id="{87DE6118-2437-4B30-8E3C-4D2BE6020583}" type="datetimeFigureOut">
               <a:rPr lang="en-US" dirty="0"/>
-              <a:t>11/1/2021</a:t>
+              <a:t>11/2/2021</a:t>
             </a:fld>
             <a:endParaRPr lang="en-US" dirty="0"/>
           </a:p>
@@ -3404,7 +3406,7 @@
           <a:p>
             <a:fld id="{87DE6118-2437-4B30-8E3C-4D2BE6020583}" type="datetimeFigureOut">
               <a:rPr lang="en-US" dirty="0"/>
-              <a:t>11/1/2021</a:t>
+              <a:t>11/2/2021</a:t>
             </a:fld>
             <a:endParaRPr lang="en-US" dirty="0"/>
           </a:p>
@@ -3569,7 +3571,7 @@
           <a:p>
             <a:fld id="{87DE6118-2437-4B30-8E3C-4D2BE6020583}" type="datetimeFigureOut">
               <a:rPr lang="en-US" dirty="0"/>
-              <a:t>11/1/2021</a:t>
+              <a:t>11/2/2021</a:t>
             </a:fld>
             <a:endParaRPr lang="en-US" dirty="0"/>
           </a:p>
@@ -3842,7 +3844,7 @@
             <a:fld id="{87DE6118-2437-4B30-8E3C-4D2BE6020583}" type="datetimeFigureOut">
               <a:rPr lang="en-US" dirty="0"/>
               <a:pPr/>
-              <a:t>11/1/2021</a:t>
+              <a:t>11/2/2021</a:t>
             </a:fld>
             <a:endParaRPr lang="en-US" dirty="0"/>
           </a:p>
@@ -4232,7 +4234,7 @@
           <a:p>
             <a:fld id="{87DE6118-2437-4B30-8E3C-4D2BE6020583}" type="datetimeFigureOut">
               <a:rPr lang="en-US" dirty="0"/>
-              <a:t>11/1/2021</a:t>
+              <a:t>11/2/2021</a:t>
             </a:fld>
             <a:endParaRPr lang="en-US" dirty="0"/>
           </a:p>
@@ -4704,7 +4706,7 @@
           <a:p>
             <a:fld id="{87DE6118-2437-4B30-8E3C-4D2BE6020583}" type="datetimeFigureOut">
               <a:rPr lang="en-US" dirty="0"/>
-              <a:t>11/1/2021</a:t>
+              <a:t>11/2/2021</a:t>
             </a:fld>
             <a:endParaRPr lang="en-US" dirty="0"/>
           </a:p>
@@ -4817,7 +4819,7 @@
           <a:p>
             <a:fld id="{87DE6118-2437-4B30-8E3C-4D2BE6020583}" type="datetimeFigureOut">
               <a:rPr lang="en-US" dirty="0"/>
-              <a:t>11/1/2021</a:t>
+              <a:t>11/2/2021</a:t>
             </a:fld>
             <a:endParaRPr lang="en-US" dirty="0"/>
           </a:p>
@@ -4907,7 +4909,7 @@
           <a:p>
             <a:fld id="{87DE6118-2437-4B30-8E3C-4D2BE6020583}" type="datetimeFigureOut">
               <a:rPr lang="en-US" dirty="0"/>
-              <a:t>11/1/2021</a:t>
+              <a:t>11/2/2021</a:t>
             </a:fld>
             <a:endParaRPr lang="en-US" dirty="0"/>
           </a:p>
@@ -5249,7 +5251,7 @@
             <a:fld id="{87DE6118-2437-4B30-8E3C-4D2BE6020583}" type="datetimeFigureOut">
               <a:rPr lang="en-US" dirty="0"/>
               <a:pPr/>
-              <a:t>11/1/2021</a:t>
+              <a:t>11/2/2021</a:t>
             </a:fld>
             <a:endParaRPr lang="en-US" dirty="0"/>
           </a:p>
@@ -5634,7 +5636,7 @@
             <a:fld id="{87DE6118-2437-4B30-8E3C-4D2BE6020583}" type="datetimeFigureOut">
               <a:rPr lang="en-US" dirty="0"/>
               <a:pPr/>
-              <a:t>11/1/2021</a:t>
+              <a:t>11/2/2021</a:t>
             </a:fld>
             <a:endParaRPr lang="en-US" dirty="0"/>
           </a:p>
@@ -5909,7 +5911,7 @@
             <a:fld id="{87DE6118-2437-4B30-8E3C-4D2BE6020583}" type="datetimeFigureOut">
               <a:rPr lang="en-US" dirty="0"/>
               <a:pPr/>
-              <a:t>11/1/2021</a:t>
+              <a:t>11/2/2021</a:t>
             </a:fld>
             <a:endParaRPr lang="en-US" dirty="0"/>
           </a:p>
@@ -6538,7 +6540,7 @@
           <p:cNvPr id="2" name="Title 1">
             <a:extLst>
               <a:ext uri="{FF2B5EF4-FFF2-40B4-BE49-F238E27FC236}">
-                <a16:creationId xmlns:a16="http://schemas.microsoft.com/office/drawing/2014/main" id="{85130699-52B6-438B-A63B-2D3822823B0C}"/>
+                <a16:creationId xmlns:a16="http://schemas.microsoft.com/office/drawing/2014/main" id="{59DFCC83-5846-48D5-8A1E-B3264F99A2BB}"/>
               </a:ext>
             </a:extLst>
           </p:cNvPr>
@@ -6549,167 +6551,58 @@
             <p:ph type="title"/>
           </p:nvPr>
         </p:nvSpPr>
-        <p:spPr/>
+        <p:spPr>
+          <a:xfrm>
+            <a:off x="1113183" y="86139"/>
+            <a:ext cx="3279912" cy="737728"/>
+          </a:xfrm>
+        </p:spPr>
         <p:txBody>
           <a:bodyPr/>
           <a:lstStyle/>
           <a:p>
             <a:r>
-              <a:rPr lang="en-IE" dirty="0"/>
-              <a:t>The Role of the Elements I’ve Used:</a:t>
-            </a:r>
-            <a:endParaRPr lang="en-US" dirty="0"/>
+              <a:rPr lang="ga-IE" dirty="0"/>
+              <a:t>Homepage</a:t>
+            </a:r>
+            <a:endParaRPr lang="en-IE" dirty="0"/>
           </a:p>
         </p:txBody>
       </p:sp>
-      <p:sp>
-        <p:nvSpPr>
-          <p:cNvPr id="3" name="Content Placeholder 2">
+      <p:pic>
+        <p:nvPicPr>
+          <p:cNvPr id="7" name="Picture 6" descr="Graphical user interface&#10;&#10;Description automatically generated">
             <a:extLst>
               <a:ext uri="{FF2B5EF4-FFF2-40B4-BE49-F238E27FC236}">
-                <a16:creationId xmlns:a16="http://schemas.microsoft.com/office/drawing/2014/main" id="{ADBB5B16-D520-4997-AE30-DCD653C1B8A7}"/>
+                <a16:creationId xmlns:a16="http://schemas.microsoft.com/office/drawing/2014/main" id="{807FA689-499E-4E47-A578-6ABD6C44400D}"/>
               </a:ext>
             </a:extLst>
           </p:cNvPr>
-          <p:cNvSpPr>
-            <a:spLocks noGrp="1"/>
-          </p:cNvSpPr>
-          <p:nvPr>
-            <p:ph idx="1"/>
-          </p:nvPr>
-        </p:nvSpPr>
+          <p:cNvPicPr>
+            <a:picLocks noChangeAspect="1"/>
+          </p:cNvPicPr>
+          <p:nvPr/>
+        </p:nvPicPr>
+        <p:blipFill>
+          <a:blip r:embed="rId2"/>
+          <a:stretch>
+            <a:fillRect/>
+          </a:stretch>
+        </p:blipFill>
         <p:spPr>
           <a:xfrm>
-            <a:off x="1371600" y="2285999"/>
-            <a:ext cx="9601200" cy="4475527"/>
+            <a:off x="1113183" y="980660"/>
+            <a:ext cx="6453998" cy="5517271"/>
           </a:xfrm>
+          <a:prstGeom prst="rect">
+            <a:avLst/>
+          </a:prstGeom>
         </p:spPr>
-        <p:txBody>
-          <a:bodyPr>
-            <a:normAutofit/>
-          </a:bodyPr>
-          <a:lstStyle/>
-          <a:p>
-            <a:pPr marL="0" indent="0">
-              <a:buNone/>
-            </a:pPr>
-            <a:r>
-              <a:rPr lang="en-IE" b="1" dirty="0"/>
-              <a:t>My Vue Components:</a:t>
-            </a:r>
-          </a:p>
-          <a:p>
-            <a:pPr marL="0" indent="0">
-              <a:buNone/>
-            </a:pPr>
-            <a:r>
-              <a:rPr lang="en-IE" b="1" dirty="0"/>
-              <a:t>Vue Router:</a:t>
-            </a:r>
-          </a:p>
-          <a:p>
-            <a:pPr marL="0" indent="0">
-              <a:buNone/>
-            </a:pPr>
-            <a:r>
-              <a:rPr lang="en-IE" b="1" dirty="0"/>
-              <a:t>My APIs:</a:t>
-            </a:r>
-          </a:p>
-          <a:p>
-            <a:r>
-              <a:rPr lang="en-IE" dirty="0" err="1"/>
-              <a:t>RestCountries</a:t>
-            </a:r>
-            <a:r>
-              <a:rPr lang="en-IE" dirty="0"/>
-              <a:t>:</a:t>
-            </a:r>
-          </a:p>
-          <a:p>
-            <a:r>
-              <a:rPr lang="en-IE" dirty="0" err="1"/>
-              <a:t>Unsplash</a:t>
-            </a:r>
-            <a:r>
-              <a:rPr lang="en-IE" dirty="0"/>
-              <a:t> &amp; </a:t>
-            </a:r>
-            <a:r>
-              <a:rPr lang="en-IE" dirty="0" err="1"/>
-              <a:t>Pexels</a:t>
-            </a:r>
-            <a:r>
-              <a:rPr lang="en-IE" dirty="0"/>
-              <a:t>:</a:t>
-            </a:r>
-          </a:p>
-          <a:p>
-            <a:r>
-              <a:rPr lang="en-IE" dirty="0" err="1"/>
-              <a:t>OpenWeatherMap</a:t>
-            </a:r>
-            <a:r>
-              <a:rPr lang="en-IE" dirty="0"/>
-              <a:t>:</a:t>
-            </a:r>
-          </a:p>
-          <a:p>
-            <a:r>
-              <a:rPr lang="en-IE" dirty="0" err="1"/>
-              <a:t>Newsapi</a:t>
-            </a:r>
-            <a:r>
-              <a:rPr lang="en-IE" dirty="0"/>
-              <a:t> &amp; Translated—</a:t>
-            </a:r>
-            <a:r>
-              <a:rPr lang="en-IE" dirty="0" err="1"/>
-              <a:t>mymemory</a:t>
-            </a:r>
-            <a:r>
-              <a:rPr lang="en-IE" dirty="0"/>
-              <a:t>:</a:t>
-            </a:r>
-          </a:p>
-          <a:p>
-            <a:r>
-              <a:rPr lang="en-IE" dirty="0" err="1"/>
-              <a:t>TheMealDB</a:t>
-            </a:r>
-            <a:r>
-              <a:rPr lang="en-IE" dirty="0"/>
-              <a:t>:</a:t>
-            </a:r>
-          </a:p>
-          <a:p>
-            <a:r>
-              <a:rPr lang="en-IE" dirty="0" err="1"/>
-              <a:t>OpenTripMap</a:t>
-            </a:r>
-            <a:r>
-              <a:rPr lang="en-IE" dirty="0"/>
-              <a:t>:</a:t>
-            </a:r>
-          </a:p>
-          <a:p>
-            <a:r>
-              <a:rPr lang="en-IE" dirty="0"/>
-              <a:t>Geolocation (Time):</a:t>
-            </a:r>
-          </a:p>
-          <a:p>
-            <a:pPr marL="0" indent="0">
-              <a:buNone/>
-            </a:pPr>
-            <a:endParaRPr lang="en-US" b="1" dirty="0"/>
-          </a:p>
-        </p:txBody>
-      </p:sp>
+      </p:pic>
     </p:spTree>
     <p:extLst>
       <p:ext uri="{BB962C8B-B14F-4D97-AF65-F5344CB8AC3E}">
-        <p14:creationId xmlns:p14="http://schemas.microsoft.com/office/powerpoint/2010/main" val="2111141242"/>
+        <p14:creationId xmlns:p14="http://schemas.microsoft.com/office/powerpoint/2010/main" val="925536690"/>
       </p:ext>
     </p:extLst>
   </p:cSld>
@@ -6741,7 +6634,7 @@
           <p:cNvPr id="2" name="Title 1">
             <a:extLst>
               <a:ext uri="{FF2B5EF4-FFF2-40B4-BE49-F238E27FC236}">
-                <a16:creationId xmlns:a16="http://schemas.microsoft.com/office/drawing/2014/main" id="{EF8C8F83-E7DA-4383-9D9C-D4FF186CE2BA}"/>
+                <a16:creationId xmlns:a16="http://schemas.microsoft.com/office/drawing/2014/main" id="{59DFCC83-5846-48D5-8A1E-B3264F99A2BB}"/>
               </a:ext>
             </a:extLst>
           </p:cNvPr>
@@ -6752,80 +6645,59 @@
             <p:ph type="title"/>
           </p:nvPr>
         </p:nvSpPr>
-        <p:spPr/>
+        <p:spPr>
+          <a:xfrm>
+            <a:off x="1166191" y="73463"/>
+            <a:ext cx="5022573" cy="681911"/>
+          </a:xfrm>
+        </p:spPr>
         <p:txBody>
-          <a:bodyPr/>
+          <a:bodyPr>
+            <a:normAutofit fontScale="90000"/>
+          </a:bodyPr>
           <a:lstStyle/>
           <a:p>
             <a:r>
-              <a:rPr lang="en-IE" dirty="0"/>
-              <a:t>Structure of Components/Pages:</a:t>
-            </a:r>
-            <a:endParaRPr lang="en-US" dirty="0"/>
+              <a:rPr lang="ga-IE" dirty="0"/>
+              <a:t>Homepage highlighted</a:t>
+            </a:r>
+            <a:endParaRPr lang="en-IE" dirty="0"/>
           </a:p>
         </p:txBody>
       </p:sp>
-      <p:sp>
-        <p:nvSpPr>
-          <p:cNvPr id="3" name="Content Placeholder 2">
+      <p:pic>
+        <p:nvPicPr>
+          <p:cNvPr id="7" name="Picture 6">
             <a:extLst>
               <a:ext uri="{FF2B5EF4-FFF2-40B4-BE49-F238E27FC236}">
-                <a16:creationId xmlns:a16="http://schemas.microsoft.com/office/drawing/2014/main" id="{2FF20509-C3E7-49F0-90A4-F9D0300F5CAE}"/>
+                <a16:creationId xmlns:a16="http://schemas.microsoft.com/office/drawing/2014/main" id="{807FA689-499E-4E47-A578-6ABD6C44400D}"/>
               </a:ext>
             </a:extLst>
           </p:cNvPr>
-          <p:cNvSpPr>
-            <a:spLocks noGrp="1"/>
-          </p:cNvSpPr>
-          <p:nvPr>
-            <p:ph idx="1"/>
-          </p:nvPr>
-        </p:nvSpPr>
-        <p:spPr/>
-        <p:txBody>
-          <a:bodyPr/>
-          <a:lstStyle/>
-          <a:p>
-            <a:r>
-              <a:rPr lang="en-IE" dirty="0"/>
-              <a:t>Card – Used for: Events, Food, News, Attractions</a:t>
-            </a:r>
-          </a:p>
-          <a:p>
-            <a:r>
-              <a:rPr lang="en-IE" dirty="0"/>
-              <a:t>Carousel:</a:t>
-            </a:r>
-          </a:p>
-          <a:p>
-            <a:r>
-              <a:rPr lang="en-IE" dirty="0" err="1"/>
-              <a:t>CountryViewer</a:t>
-            </a:r>
-            <a:r>
-              <a:rPr lang="en-IE" dirty="0"/>
-              <a:t>:</a:t>
-            </a:r>
-          </a:p>
-          <a:p>
-            <a:r>
-              <a:rPr lang="en-IE" dirty="0" err="1"/>
-              <a:t>NavBar</a:t>
-            </a:r>
-            <a:r>
-              <a:rPr lang="en-IE" dirty="0"/>
-              <a:t>:</a:t>
-            </a:r>
-          </a:p>
-          <a:p>
-            <a:endParaRPr lang="en-IE" dirty="0"/>
-          </a:p>
-        </p:txBody>
-      </p:sp>
+          <p:cNvPicPr>
+            <a:picLocks noChangeAspect="1"/>
+          </p:cNvPicPr>
+          <p:nvPr/>
+        </p:nvPicPr>
+        <p:blipFill>
+          <a:blip r:embed="rId2"/>
+          <a:srcRect/>
+          <a:stretch/>
+        </p:blipFill>
+        <p:spPr>
+          <a:xfrm>
+            <a:off x="1113182" y="684219"/>
+            <a:ext cx="10376453" cy="5933976"/>
+          </a:xfrm>
+          <a:prstGeom prst="rect">
+            <a:avLst/>
+          </a:prstGeom>
+        </p:spPr>
+      </p:pic>
     </p:spTree>
     <p:extLst>
       <p:ext uri="{BB962C8B-B14F-4D97-AF65-F5344CB8AC3E}">
-        <p14:creationId xmlns:p14="http://schemas.microsoft.com/office/powerpoint/2010/main" val="258523622"/>
+        <p14:creationId xmlns:p14="http://schemas.microsoft.com/office/powerpoint/2010/main" val="3970718956"/>
       </p:ext>
     </p:extLst>
   </p:cSld>
@@ -6857,7 +6729,7 @@
           <p:cNvPr id="2" name="Title 1">
             <a:extLst>
               <a:ext uri="{FF2B5EF4-FFF2-40B4-BE49-F238E27FC236}">
-                <a16:creationId xmlns:a16="http://schemas.microsoft.com/office/drawing/2014/main" id="{0C691C4B-5082-4463-A90C-8DC97C27CEA0}"/>
+                <a16:creationId xmlns:a16="http://schemas.microsoft.com/office/drawing/2014/main" id="{85130699-52B6-438B-A63B-2D3822823B0C}"/>
               </a:ext>
             </a:extLst>
           </p:cNvPr>
@@ -6875,7 +6747,7 @@
           <a:p>
             <a:r>
               <a:rPr lang="en-IE" dirty="0"/>
-              <a:t>About the libraries I’ve used:</a:t>
+              <a:t>The Role of the Elements I’ve Used:</a:t>
             </a:r>
             <a:endParaRPr lang="en-US" dirty="0"/>
           </a:p>
@@ -6886,7 +6758,7 @@
           <p:cNvPr id="3" name="Content Placeholder 2">
             <a:extLst>
               <a:ext uri="{FF2B5EF4-FFF2-40B4-BE49-F238E27FC236}">
-                <a16:creationId xmlns:a16="http://schemas.microsoft.com/office/drawing/2014/main" id="{577198C4-3DC9-4DF3-9A2B-89FFB462CF3C}"/>
+                <a16:creationId xmlns:a16="http://schemas.microsoft.com/office/drawing/2014/main" id="{ADBB5B16-D520-4997-AE30-DCD653C1B8A7}"/>
               </a:ext>
             </a:extLst>
           </p:cNvPr>
@@ -6897,25 +6769,130 @@
             <p:ph idx="1"/>
           </p:nvPr>
         </p:nvSpPr>
-        <p:spPr/>
+        <p:spPr>
+          <a:xfrm>
+            <a:off x="1371600" y="2285999"/>
+            <a:ext cx="9601200" cy="4475527"/>
+          </a:xfrm>
+        </p:spPr>
         <p:txBody>
-          <a:bodyPr/>
+          <a:bodyPr>
+            <a:normAutofit/>
+          </a:bodyPr>
           <a:lstStyle/>
           <a:p>
-            <a:r>
-              <a:rPr lang="en-IE" b="1" dirty="0" err="1"/>
-              <a:t>Axios</a:t>
-            </a:r>
+            <a:pPr marL="0" indent="0">
+              <a:buNone/>
+            </a:pPr>
             <a:r>
               <a:rPr lang="en-IE" b="1" dirty="0"/>
+              <a:t>My Vue Components:</a:t>
+            </a:r>
+          </a:p>
+          <a:p>
+            <a:pPr marL="0" indent="0">
+              <a:buNone/>
+            </a:pPr>
+            <a:r>
+              <a:rPr lang="en-IE" b="1" dirty="0"/>
+              <a:t>Vue Router:</a:t>
+            </a:r>
+          </a:p>
+          <a:p>
+            <a:pPr marL="0" indent="0">
+              <a:buNone/>
+            </a:pPr>
+            <a:r>
+              <a:rPr lang="en-IE" b="1" dirty="0"/>
+              <a:t>My APIs:</a:t>
+            </a:r>
+          </a:p>
+          <a:p>
+            <a:r>
+              <a:rPr lang="en-IE" dirty="0" err="1"/>
+              <a:t>RestCountries</a:t>
+            </a:r>
+            <a:r>
+              <a:rPr lang="en-IE" dirty="0"/>
               <a:t>:</a:t>
             </a:r>
           </a:p>
           <a:p>
             <a:r>
-              <a:rPr lang="en-IE" b="1" dirty="0"/>
-              <a:t>Vue-Paginate:</a:t>
-            </a:r>
+              <a:rPr lang="en-IE" dirty="0" err="1"/>
+              <a:t>Unsplash</a:t>
+            </a:r>
+            <a:r>
+              <a:rPr lang="en-IE" dirty="0"/>
+              <a:t> &amp; </a:t>
+            </a:r>
+            <a:r>
+              <a:rPr lang="en-IE" dirty="0" err="1"/>
+              <a:t>Pexels</a:t>
+            </a:r>
+            <a:r>
+              <a:rPr lang="en-IE" dirty="0"/>
+              <a:t>:</a:t>
+            </a:r>
+          </a:p>
+          <a:p>
+            <a:r>
+              <a:rPr lang="en-IE" dirty="0" err="1"/>
+              <a:t>OpenWeatherMap</a:t>
+            </a:r>
+            <a:r>
+              <a:rPr lang="en-IE" dirty="0"/>
+              <a:t>:</a:t>
+            </a:r>
+          </a:p>
+          <a:p>
+            <a:r>
+              <a:rPr lang="en-IE" dirty="0" err="1"/>
+              <a:t>Newsapi</a:t>
+            </a:r>
+            <a:r>
+              <a:rPr lang="en-IE" dirty="0"/>
+              <a:t> &amp; Translated—</a:t>
+            </a:r>
+            <a:r>
+              <a:rPr lang="en-IE" dirty="0" err="1"/>
+              <a:t>mymemory</a:t>
+            </a:r>
+            <a:r>
+              <a:rPr lang="en-IE" dirty="0"/>
+              <a:t>:</a:t>
+            </a:r>
+          </a:p>
+          <a:p>
+            <a:r>
+              <a:rPr lang="en-IE" dirty="0" err="1"/>
+              <a:t>TheMealDB</a:t>
+            </a:r>
+            <a:r>
+              <a:rPr lang="en-IE" dirty="0"/>
+              <a:t>:</a:t>
+            </a:r>
+          </a:p>
+          <a:p>
+            <a:r>
+              <a:rPr lang="en-IE" dirty="0" err="1"/>
+              <a:t>OpenTripMap</a:t>
+            </a:r>
+            <a:r>
+              <a:rPr lang="en-IE" dirty="0"/>
+              <a:t>:</a:t>
+            </a:r>
+          </a:p>
+          <a:p>
+            <a:r>
+              <a:rPr lang="en-IE" dirty="0"/>
+              <a:t>Geolocation (Time):</a:t>
+            </a:r>
+          </a:p>
+          <a:p>
+            <a:pPr marL="0" indent="0">
+              <a:buNone/>
+            </a:pPr>
             <a:endParaRPr lang="en-US" b="1" dirty="0"/>
           </a:p>
         </p:txBody>
@@ -6923,7 +6900,7 @@
     </p:spTree>
     <p:extLst>
       <p:ext uri="{BB962C8B-B14F-4D97-AF65-F5344CB8AC3E}">
-        <p14:creationId xmlns:p14="http://schemas.microsoft.com/office/powerpoint/2010/main" val="3665738480"/>
+        <p14:creationId xmlns:p14="http://schemas.microsoft.com/office/powerpoint/2010/main" val="2111141242"/>
       </p:ext>
     </p:extLst>
   </p:cSld>
@@ -6955,6 +6932,220 @@
           <p:cNvPr id="2" name="Title 1">
             <a:extLst>
               <a:ext uri="{FF2B5EF4-FFF2-40B4-BE49-F238E27FC236}">
+                <a16:creationId xmlns:a16="http://schemas.microsoft.com/office/drawing/2014/main" id="{EF8C8F83-E7DA-4383-9D9C-D4FF186CE2BA}"/>
+              </a:ext>
+            </a:extLst>
+          </p:cNvPr>
+          <p:cNvSpPr>
+            <a:spLocks noGrp="1"/>
+          </p:cNvSpPr>
+          <p:nvPr>
+            <p:ph type="title"/>
+          </p:nvPr>
+        </p:nvSpPr>
+        <p:spPr/>
+        <p:txBody>
+          <a:bodyPr/>
+          <a:lstStyle/>
+          <a:p>
+            <a:r>
+              <a:rPr lang="en-IE" dirty="0"/>
+              <a:t>Structure of Components/Pages:</a:t>
+            </a:r>
+            <a:endParaRPr lang="en-US" dirty="0"/>
+          </a:p>
+        </p:txBody>
+      </p:sp>
+      <p:sp>
+        <p:nvSpPr>
+          <p:cNvPr id="3" name="Content Placeholder 2">
+            <a:extLst>
+              <a:ext uri="{FF2B5EF4-FFF2-40B4-BE49-F238E27FC236}">
+                <a16:creationId xmlns:a16="http://schemas.microsoft.com/office/drawing/2014/main" id="{2FF20509-C3E7-49F0-90A4-F9D0300F5CAE}"/>
+              </a:ext>
+            </a:extLst>
+          </p:cNvPr>
+          <p:cNvSpPr>
+            <a:spLocks noGrp="1"/>
+          </p:cNvSpPr>
+          <p:nvPr>
+            <p:ph idx="1"/>
+          </p:nvPr>
+        </p:nvSpPr>
+        <p:spPr/>
+        <p:txBody>
+          <a:bodyPr/>
+          <a:lstStyle/>
+          <a:p>
+            <a:r>
+              <a:rPr lang="en-IE" dirty="0"/>
+              <a:t>Card – Used for: Events, Food, News, Attractions</a:t>
+            </a:r>
+          </a:p>
+          <a:p>
+            <a:r>
+              <a:rPr lang="en-IE" dirty="0"/>
+              <a:t>Carousel:</a:t>
+            </a:r>
+          </a:p>
+          <a:p>
+            <a:r>
+              <a:rPr lang="en-IE" dirty="0" err="1"/>
+              <a:t>CountryViewer</a:t>
+            </a:r>
+            <a:r>
+              <a:rPr lang="en-IE" dirty="0"/>
+              <a:t>:</a:t>
+            </a:r>
+          </a:p>
+          <a:p>
+            <a:r>
+              <a:rPr lang="en-IE" dirty="0" err="1"/>
+              <a:t>NavBar</a:t>
+            </a:r>
+            <a:r>
+              <a:rPr lang="en-IE" dirty="0"/>
+              <a:t>:</a:t>
+            </a:r>
+          </a:p>
+          <a:p>
+            <a:endParaRPr lang="en-IE" dirty="0"/>
+          </a:p>
+        </p:txBody>
+      </p:sp>
+    </p:spTree>
+    <p:extLst>
+      <p:ext uri="{BB962C8B-B14F-4D97-AF65-F5344CB8AC3E}">
+        <p14:creationId xmlns:p14="http://schemas.microsoft.com/office/powerpoint/2010/main" val="258523622"/>
+      </p:ext>
+    </p:extLst>
+  </p:cSld>
+  <p:clrMapOvr>
+    <a:masterClrMapping/>
+  </p:clrMapOvr>
+</p:sld>
+</file>
+
+<file path=ppt/slides/slide6.xml><?xml version="1.0" encoding="utf-8"?>
+<p:sld xmlns:a="http://schemas.openxmlformats.org/drawingml/2006/main" xmlns:r="http://schemas.openxmlformats.org/officeDocument/2006/relationships" xmlns:p="http://schemas.openxmlformats.org/presentationml/2006/main">
+  <p:cSld>
+    <p:spTree>
+      <p:nvGrpSpPr>
+        <p:cNvPr id="1" name=""/>
+        <p:cNvGrpSpPr/>
+        <p:nvPr/>
+      </p:nvGrpSpPr>
+      <p:grpSpPr>
+        <a:xfrm>
+          <a:off x="0" y="0"/>
+          <a:ext cx="0" cy="0"/>
+          <a:chOff x="0" y="0"/>
+          <a:chExt cx="0" cy="0"/>
+        </a:xfrm>
+      </p:grpSpPr>
+      <p:sp>
+        <p:nvSpPr>
+          <p:cNvPr id="2" name="Title 1">
+            <a:extLst>
+              <a:ext uri="{FF2B5EF4-FFF2-40B4-BE49-F238E27FC236}">
+                <a16:creationId xmlns:a16="http://schemas.microsoft.com/office/drawing/2014/main" id="{0C691C4B-5082-4463-A90C-8DC97C27CEA0}"/>
+              </a:ext>
+            </a:extLst>
+          </p:cNvPr>
+          <p:cNvSpPr>
+            <a:spLocks noGrp="1"/>
+          </p:cNvSpPr>
+          <p:nvPr>
+            <p:ph type="title"/>
+          </p:nvPr>
+        </p:nvSpPr>
+        <p:spPr/>
+        <p:txBody>
+          <a:bodyPr/>
+          <a:lstStyle/>
+          <a:p>
+            <a:r>
+              <a:rPr lang="en-IE" dirty="0"/>
+              <a:t>About the libraries I’ve used:</a:t>
+            </a:r>
+            <a:endParaRPr lang="en-US" dirty="0"/>
+          </a:p>
+        </p:txBody>
+      </p:sp>
+      <p:sp>
+        <p:nvSpPr>
+          <p:cNvPr id="3" name="Content Placeholder 2">
+            <a:extLst>
+              <a:ext uri="{FF2B5EF4-FFF2-40B4-BE49-F238E27FC236}">
+                <a16:creationId xmlns:a16="http://schemas.microsoft.com/office/drawing/2014/main" id="{577198C4-3DC9-4DF3-9A2B-89FFB462CF3C}"/>
+              </a:ext>
+            </a:extLst>
+          </p:cNvPr>
+          <p:cNvSpPr>
+            <a:spLocks noGrp="1"/>
+          </p:cNvSpPr>
+          <p:nvPr>
+            <p:ph idx="1"/>
+          </p:nvPr>
+        </p:nvSpPr>
+        <p:spPr/>
+        <p:txBody>
+          <a:bodyPr/>
+          <a:lstStyle/>
+          <a:p>
+            <a:r>
+              <a:rPr lang="en-IE" b="1" dirty="0" err="1"/>
+              <a:t>Axios</a:t>
+            </a:r>
+            <a:r>
+              <a:rPr lang="en-IE" b="1" dirty="0"/>
+              <a:t>:</a:t>
+            </a:r>
+          </a:p>
+          <a:p>
+            <a:r>
+              <a:rPr lang="en-IE" b="1" dirty="0"/>
+              <a:t>Vue-Paginate:</a:t>
+            </a:r>
+            <a:endParaRPr lang="en-US" b="1" dirty="0"/>
+          </a:p>
+        </p:txBody>
+      </p:sp>
+    </p:spTree>
+    <p:extLst>
+      <p:ext uri="{BB962C8B-B14F-4D97-AF65-F5344CB8AC3E}">
+        <p14:creationId xmlns:p14="http://schemas.microsoft.com/office/powerpoint/2010/main" val="3665738480"/>
+      </p:ext>
+    </p:extLst>
+  </p:cSld>
+  <p:clrMapOvr>
+    <a:masterClrMapping/>
+  </p:clrMapOvr>
+</p:sld>
+</file>
+
+<file path=ppt/slides/slide7.xml><?xml version="1.0" encoding="utf-8"?>
+<p:sld xmlns:a="http://schemas.openxmlformats.org/drawingml/2006/main" xmlns:r="http://schemas.openxmlformats.org/officeDocument/2006/relationships" xmlns:p="http://schemas.openxmlformats.org/presentationml/2006/main">
+  <p:cSld>
+    <p:spTree>
+      <p:nvGrpSpPr>
+        <p:cNvPr id="1" name=""/>
+        <p:cNvGrpSpPr/>
+        <p:nvPr/>
+      </p:nvGrpSpPr>
+      <p:grpSpPr>
+        <a:xfrm>
+          <a:off x="0" y="0"/>
+          <a:ext cx="0" cy="0"/>
+          <a:chOff x="0" y="0"/>
+          <a:chExt cx="0" cy="0"/>
+        </a:xfrm>
+      </p:grpSpPr>
+      <p:sp>
+        <p:nvSpPr>
+          <p:cNvPr id="2" name="Title 1">
+            <a:extLst>
+              <a:ext uri="{FF2B5EF4-FFF2-40B4-BE49-F238E27FC236}">
                 <a16:creationId xmlns:a16="http://schemas.microsoft.com/office/drawing/2014/main" id="{2338C1E1-3CA8-4697-BD10-10C18C77CD41}"/>
               </a:ext>
             </a:extLst>
@@ -7048,7 +7239,7 @@
 </p:sld>
 </file>
 
-<file path=ppt/slides/slide6.xml><?xml version="1.0" encoding="utf-8"?>
+<file path=ppt/slides/slide8.xml><?xml version="1.0" encoding="utf-8"?>
 <p:sld xmlns:a="http://schemas.openxmlformats.org/drawingml/2006/main" xmlns:r="http://schemas.openxmlformats.org/officeDocument/2006/relationships" xmlns:p="http://schemas.openxmlformats.org/presentationml/2006/main">
   <p:cSld>
     <p:spTree>
@@ -7135,7 +7326,7 @@
 </p:sld>
 </file>
 
-<file path=ppt/slides/slide7.xml><?xml version="1.0" encoding="utf-8"?>
+<file path=ppt/slides/slide9.xml><?xml version="1.0" encoding="utf-8"?>
 <p:sld xmlns:a="http://schemas.openxmlformats.org/drawingml/2006/main" xmlns:r="http://schemas.openxmlformats.org/officeDocument/2006/relationships" xmlns:p="http://schemas.openxmlformats.org/presentationml/2006/main">
   <p:cSld>
     <p:spTree>

</xml_diff>